<commit_message>
Updating powerpoint for session2
</commit_message>
<xml_diff>
--- a/Session2_Slides.pptx
+++ b/Session2_Slides.pptx
@@ -57,9 +57,6 @@
     <p:sldId id="302" r:id="rId54"/>
     <p:sldId id="303" r:id="rId55"/>
     <p:sldId id="304" r:id="rId56"/>
-    <p:sldId id="305" r:id="rId57"/>
-    <p:sldId id="306" r:id="rId58"/>
-    <p:sldId id="307" r:id="rId59"/>
   </p:sldIdLst>
   <p:sldSz cx="13004800" cy="9753600"/>
   <p:notesSz cx="6858000" cy="9144000"/>
@@ -8404,7 +8401,7 @@
           <a:p>
             <a:pPr/>
             <a:r>
-              <a:t>if Statement</a:t>
+              <a:t>Examples of conditions</a:t>
             </a:r>
           </a:p>
         </p:txBody>
@@ -8413,54 +8410,95 @@
         <p:nvSpPr>
           <p:cNvPr id="284" name="Shape 284"/>
           <p:cNvSpPr/>
-          <p:nvPr/>
-        </p:nvSpPr>
-        <p:spPr>
-          <a:xfrm>
-            <a:off x="444350" y="4000499"/>
-            <a:ext cx="11562527" cy="2057401"/>
-          </a:xfrm>
-          <a:prstGeom prst="rect">
-            <a:avLst/>
-          </a:prstGeom>
-          <a:ln w="12700">
-            <a:miter lim="400000"/>
-          </a:ln>
-          <a:extLst>
-            <a:ext uri="{C572A759-6A51-4108-AA02-DFA0A04FC94B}">
-              <ma14:wrappingTextBoxFlag xmlns:ma14="http://schemas.microsoft.com/office/mac/drawingml/2011/main" val="1"/>
-            </a:ext>
-          </a:extLst>
-        </p:spPr>
-        <p:txBody>
-          <a:bodyPr lIns="50800" tIns="50800" rIns="50800" bIns="50800" anchor="ctr">
-            <a:spAutoFit/>
-          </a:bodyPr>
+          <p:nvPr>
+            <p:ph type="body" idx="1"/>
+          </p:nvPr>
+        </p:nvSpPr>
+        <p:spPr>
+          <a:xfrm>
+            <a:off x="406400" y="3953767"/>
+            <a:ext cx="12192000" cy="5296375"/>
+          </a:xfrm>
+          <a:prstGeom prst="rect">
+            <a:avLst/>
+          </a:prstGeom>
+        </p:spPr>
+        <p:txBody>
+          <a:bodyPr/>
           <a:lstStyle/>
           <a:p>
-            <a:pPr>
-              <a:defRPr sz="5400">
-                <a:latin typeface="Anonymous Pro for Powerline"/>
-                <a:ea typeface="Anonymous Pro for Powerline"/>
-                <a:cs typeface="Anonymous Pro for Powerline"/>
-                <a:sym typeface="Anonymous Pro for Powerline"/>
-              </a:defRPr>
+            <a:pPr marL="705970" indent="-705970">
+              <a:buClrTx/>
+              <a:buSzPct val="40000"/>
+              <a:buFontTx/>
+              <a:buBlip>
+                <a:blip r:embed="rId2"/>
+              </a:buBlip>
+              <a:defRPr sz="6400"/>
             </a:pPr>
             <a:r>
-              <a:t>if condition_is_true:</a:t>
-            </a:r>
-          </a:p>
-          <a:p>
-            <a:pPr>
-              <a:defRPr sz="5400">
-                <a:latin typeface="Anonymous Pro for Powerline"/>
-                <a:ea typeface="Anonymous Pro for Powerline"/>
-                <a:cs typeface="Anonymous Pro for Powerline"/>
-                <a:sym typeface="Anonymous Pro for Powerline"/>
-              </a:defRPr>
+              <a:t>my_name </a:t>
+            </a:r>
+            <a:r>
+              <a:rPr>
+                <a:solidFill>
+                  <a:schemeClr val="accent3"/>
+                </a:solidFill>
+              </a:rPr>
+              <a:t>==</a:t>
+            </a:r>
+            <a:r>
+              <a:t> “Rob”</a:t>
+            </a:r>
+          </a:p>
+          <a:p>
+            <a:pPr marL="705970" indent="-705970">
+              <a:buClrTx/>
+              <a:buSzPct val="40000"/>
+              <a:buFontTx/>
+              <a:buBlip>
+                <a:blip r:embed="rId2"/>
+              </a:buBlip>
+              <a:defRPr sz="6400"/>
             </a:pPr>
             <a:r>
-              <a:t>    print(“extra code runs!”)</a:t>
+              <a:t>age </a:t>
+            </a:r>
+            <a:r>
+              <a:rPr>
+                <a:solidFill>
+                  <a:schemeClr val="accent3"/>
+                </a:solidFill>
+              </a:rPr>
+              <a:t>&gt;</a:t>
+            </a:r>
+            <a:r>
+              <a:t> 21</a:t>
+            </a:r>
+          </a:p>
+          <a:p>
+            <a:pPr marL="705970" indent="-705970">
+              <a:buClrTx/>
+              <a:buSzPct val="40000"/>
+              <a:buFontTx/>
+              <a:buBlip>
+                <a:blip r:embed="rId2"/>
+              </a:buBlip>
+              <a:defRPr sz="6400"/>
+            </a:pPr>
+            <a:r>
+              <a:t>name </a:t>
+            </a:r>
+            <a:r>
+              <a:rPr>
+                <a:solidFill>
+                  <a:schemeClr val="accent3"/>
+                </a:solidFill>
+              </a:rPr>
+              <a:t>in</a:t>
+            </a:r>
+            <a:r>
+              <a:t> list_of_guests</a:t>
             </a:r>
           </a:p>
         </p:txBody>
@@ -8495,6 +8533,123 @@
         <p:nvSpPr>
           <p:cNvPr id="286" name="Shape 286"/>
           <p:cNvSpPr/>
+          <p:nvPr>
+            <p:ph type="title"/>
+          </p:nvPr>
+        </p:nvSpPr>
+        <p:spPr>
+          <a:xfrm>
+            <a:off x="406400" y="1536700"/>
+            <a:ext cx="12192000" cy="1169260"/>
+          </a:xfrm>
+          <a:prstGeom prst="rect">
+            <a:avLst/>
+          </a:prstGeom>
+        </p:spPr>
+        <p:txBody>
+          <a:bodyPr/>
+          <a:lstStyle>
+            <a:lvl1pPr defTabSz="403097">
+              <a:spcBef>
+                <a:spcPts val="1900"/>
+              </a:spcBef>
+              <a:defRPr sz="8280"/>
+            </a:lvl1pPr>
+          </a:lstStyle>
+          <a:p>
+            <a:pPr/>
+            <a:r>
+              <a:t>if Statement</a:t>
+            </a:r>
+          </a:p>
+        </p:txBody>
+      </p:sp>
+      <p:sp>
+        <p:nvSpPr>
+          <p:cNvPr id="287" name="Shape 287"/>
+          <p:cNvSpPr/>
+          <p:nvPr/>
+        </p:nvSpPr>
+        <p:spPr>
+          <a:xfrm>
+            <a:off x="444350" y="4000499"/>
+            <a:ext cx="11562527" cy="2057401"/>
+          </a:xfrm>
+          <a:prstGeom prst="rect">
+            <a:avLst/>
+          </a:prstGeom>
+          <a:ln w="12700">
+            <a:miter lim="400000"/>
+          </a:ln>
+          <a:extLst>
+            <a:ext uri="{C572A759-6A51-4108-AA02-DFA0A04FC94B}">
+              <ma14:wrappingTextBoxFlag xmlns:ma14="http://schemas.microsoft.com/office/mac/drawingml/2011/main" val="1"/>
+            </a:ext>
+          </a:extLst>
+        </p:spPr>
+        <p:txBody>
+          <a:bodyPr lIns="50800" tIns="50800" rIns="50800" bIns="50800" anchor="ctr">
+            <a:spAutoFit/>
+          </a:bodyPr>
+          <a:lstStyle/>
+          <a:p>
+            <a:pPr>
+              <a:defRPr sz="5400">
+                <a:latin typeface="Anonymous Pro for Powerline"/>
+                <a:ea typeface="Anonymous Pro for Powerline"/>
+                <a:cs typeface="Anonymous Pro for Powerline"/>
+                <a:sym typeface="Anonymous Pro for Powerline"/>
+              </a:defRPr>
+            </a:pPr>
+            <a:r>
+              <a:t>if condition_is_true:</a:t>
+            </a:r>
+          </a:p>
+          <a:p>
+            <a:pPr>
+              <a:defRPr sz="5400">
+                <a:latin typeface="Anonymous Pro for Powerline"/>
+                <a:ea typeface="Anonymous Pro for Powerline"/>
+                <a:cs typeface="Anonymous Pro for Powerline"/>
+                <a:sym typeface="Anonymous Pro for Powerline"/>
+              </a:defRPr>
+            </a:pPr>
+            <a:r>
+              <a:t>    print(“extra code runs!”)</a:t>
+            </a:r>
+          </a:p>
+        </p:txBody>
+      </p:sp>
+    </p:spTree>
+  </p:cSld>
+  <p:clrMapOvr>
+    <a:masterClrMapping/>
+  </p:clrMapOvr>
+  <p:transition xmlns:p14="http://schemas.microsoft.com/office/powerpoint/2010/main" spd="med" advClick="1"/>
+</p:sld>
+</file>
+
+<file path=ppt/slides/slide29.xml><?xml version="1.0" encoding="utf-8"?>
+<p:sld xmlns:a="http://schemas.openxmlformats.org/drawingml/2006/main" xmlns:r="http://schemas.openxmlformats.org/officeDocument/2006/relationships" xmlns:p="http://schemas.openxmlformats.org/presentationml/2006/main" showMasterSp="1" showMasterPhAnim="1">
+  <p:cSld>
+    <p:spTree>
+      <p:nvGrpSpPr>
+        <p:cNvPr id="1" name=""/>
+        <p:cNvGrpSpPr/>
+        <p:nvPr/>
+      </p:nvGrpSpPr>
+      <p:grpSpPr>
+        <a:xfrm>
+          <a:off x="0" y="0"/>
+          <a:ext cx="0" cy="0"/>
+          <a:chOff x="0" y="0"/>
+          <a:chExt cx="0" cy="0"/>
+        </a:xfrm>
+      </p:grpSpPr>
+      <p:sp>
+        <p:nvSpPr>
+          <p:cNvPr id="289" name="Shape 289"/>
+          <p:cNvSpPr/>
           <p:nvPr/>
         </p:nvSpPr>
         <p:spPr>
@@ -8541,7 +8696,7 @@
       </p:sp>
       <p:sp>
         <p:nvSpPr>
-          <p:cNvPr id="287" name="Shape 287"/>
+          <p:cNvPr id="290" name="Shape 290"/>
           <p:cNvSpPr/>
           <p:nvPr/>
         </p:nvSpPr>
@@ -8586,7 +8741,7 @@
       </p:sp>
       <p:sp>
         <p:nvSpPr>
-          <p:cNvPr id="288" name="Shape 288"/>
+          <p:cNvPr id="291" name="Shape 291"/>
           <p:cNvSpPr/>
           <p:nvPr/>
         </p:nvSpPr>
@@ -8631,7 +8786,7 @@
       </p:sp>
       <p:sp>
         <p:nvSpPr>
-          <p:cNvPr id="289" name="Shape 289"/>
+          <p:cNvPr id="292" name="Shape 292"/>
           <p:cNvSpPr/>
           <p:nvPr/>
         </p:nvSpPr>
@@ -8679,7 +8834,7 @@
       </p:sp>
       <p:sp>
         <p:nvSpPr>
-          <p:cNvPr id="290" name="Shape 290"/>
+          <p:cNvPr id="293" name="Shape 293"/>
           <p:cNvSpPr/>
           <p:nvPr/>
         </p:nvSpPr>
@@ -8727,7 +8882,7 @@
       </p:sp>
       <p:sp>
         <p:nvSpPr>
-          <p:cNvPr id="291" name="Shape 291"/>
+          <p:cNvPr id="294" name="Shape 294"/>
           <p:cNvSpPr/>
           <p:nvPr>
             <p:ph type="title" idx="4294967295"/>
@@ -8762,7 +8917,7 @@
       </p:sp>
       <p:sp>
         <p:nvSpPr>
-          <p:cNvPr id="292" name="Shape 292"/>
+          <p:cNvPr id="295" name="Shape 295"/>
           <p:cNvSpPr/>
           <p:nvPr/>
         </p:nvSpPr>
@@ -8841,7 +8996,7 @@
       </p:sp>
       <p:sp>
         <p:nvSpPr>
-          <p:cNvPr id="293" name="Shape 293"/>
+          <p:cNvPr id="296" name="Shape 296"/>
           <p:cNvSpPr/>
           <p:nvPr/>
         </p:nvSpPr>
@@ -8889,7 +9044,7 @@
       </p:sp>
       <p:sp>
         <p:nvSpPr>
-          <p:cNvPr id="294" name="Shape 294"/>
+          <p:cNvPr id="297" name="Shape 297"/>
           <p:cNvSpPr/>
           <p:nvPr/>
         </p:nvSpPr>
@@ -8934,7 +9089,7 @@
       </p:sp>
       <p:sp>
         <p:nvSpPr>
-          <p:cNvPr id="295" name="Shape 295"/>
+          <p:cNvPr id="298" name="Shape 298"/>
           <p:cNvSpPr/>
           <p:nvPr/>
         </p:nvSpPr>
@@ -8982,7 +9137,7 @@
       </p:sp>
       <p:sp>
         <p:nvSpPr>
-          <p:cNvPr id="296" name="Shape 296"/>
+          <p:cNvPr id="299" name="Shape 299"/>
           <p:cNvSpPr/>
           <p:nvPr/>
         </p:nvSpPr>
@@ -9030,7 +9185,7 @@
       </p:sp>
       <p:sp>
         <p:nvSpPr>
-          <p:cNvPr id="297" name="Shape 297"/>
+          <p:cNvPr id="300" name="Shape 300"/>
           <p:cNvSpPr/>
           <p:nvPr/>
         </p:nvSpPr>
@@ -9078,7 +9233,7 @@
       </p:sp>
       <p:sp>
         <p:nvSpPr>
-          <p:cNvPr id="298" name="Shape 298"/>
+          <p:cNvPr id="301" name="Shape 301"/>
           <p:cNvSpPr/>
           <p:nvPr/>
         </p:nvSpPr>
@@ -9126,7 +9281,7 @@
       </p:sp>
       <p:sp>
         <p:nvSpPr>
-          <p:cNvPr id="299" name="Shape 299"/>
+          <p:cNvPr id="302" name="Shape 302"/>
           <p:cNvSpPr/>
           <p:nvPr/>
         </p:nvSpPr>
@@ -9174,7 +9329,7 @@
       </p:sp>
       <p:sp>
         <p:nvSpPr>
-          <p:cNvPr id="300" name="Shape 300"/>
+          <p:cNvPr id="303" name="Shape 303"/>
           <p:cNvSpPr/>
           <p:nvPr/>
         </p:nvSpPr>
@@ -9217,149 +9372,6 @@
                 <a:sym typeface="DIN Condensed"/>
               </a:defRPr>
             </a:pPr>
-          </a:p>
-        </p:txBody>
-      </p:sp>
-    </p:spTree>
-  </p:cSld>
-  <p:clrMapOvr>
-    <a:masterClrMapping/>
-  </p:clrMapOvr>
-  <p:transition xmlns:p14="http://schemas.microsoft.com/office/powerpoint/2010/main" spd="med" advClick="1"/>
-</p:sld>
-</file>
-
-<file path=ppt/slides/slide29.xml><?xml version="1.0" encoding="utf-8"?>
-<p:sld xmlns:a="http://schemas.openxmlformats.org/drawingml/2006/main" xmlns:r="http://schemas.openxmlformats.org/officeDocument/2006/relationships" xmlns:p="http://schemas.openxmlformats.org/presentationml/2006/main" showMasterSp="1" showMasterPhAnim="1">
-  <p:cSld>
-    <p:spTree>
-      <p:nvGrpSpPr>
-        <p:cNvPr id="1" name=""/>
-        <p:cNvGrpSpPr/>
-        <p:nvPr/>
-      </p:nvGrpSpPr>
-      <p:grpSpPr>
-        <a:xfrm>
-          <a:off x="0" y="0"/>
-          <a:ext cx="0" cy="0"/>
-          <a:chOff x="0" y="0"/>
-          <a:chExt cx="0" cy="0"/>
-        </a:xfrm>
-      </p:grpSpPr>
-      <p:sp>
-        <p:nvSpPr>
-          <p:cNvPr id="302" name="Shape 302"/>
-          <p:cNvSpPr/>
-          <p:nvPr>
-            <p:ph type="title"/>
-          </p:nvPr>
-        </p:nvSpPr>
-        <p:spPr>
-          <a:xfrm>
-            <a:off x="406400" y="1536700"/>
-            <a:ext cx="12192000" cy="1169260"/>
-          </a:xfrm>
-          <a:prstGeom prst="rect">
-            <a:avLst/>
-          </a:prstGeom>
-        </p:spPr>
-        <p:txBody>
-          <a:bodyPr/>
-          <a:lstStyle>
-            <a:lvl1pPr defTabSz="403097">
-              <a:spcBef>
-                <a:spcPts val="1900"/>
-              </a:spcBef>
-              <a:defRPr sz="8280"/>
-            </a:lvl1pPr>
-          </a:lstStyle>
-          <a:p>
-            <a:pPr/>
-            <a:r>
-              <a:t>if-Else Statement</a:t>
-            </a:r>
-          </a:p>
-        </p:txBody>
-      </p:sp>
-      <p:sp>
-        <p:nvSpPr>
-          <p:cNvPr id="303" name="Shape 303"/>
-          <p:cNvSpPr/>
-          <p:nvPr/>
-        </p:nvSpPr>
-        <p:spPr>
-          <a:xfrm>
-            <a:off x="512083" y="3644899"/>
-            <a:ext cx="11562527" cy="4318001"/>
-          </a:xfrm>
-          <a:prstGeom prst="rect">
-            <a:avLst/>
-          </a:prstGeom>
-          <a:ln w="12700">
-            <a:miter lim="400000"/>
-          </a:ln>
-          <a:extLst>
-            <a:ext uri="{C572A759-6A51-4108-AA02-DFA0A04FC94B}">
-              <ma14:wrappingTextBoxFlag xmlns:ma14="http://schemas.microsoft.com/office/mac/drawingml/2011/main" val="1"/>
-            </a:ext>
-          </a:extLst>
-        </p:spPr>
-        <p:txBody>
-          <a:bodyPr lIns="50800" tIns="50800" rIns="50800" bIns="50800" anchor="ctr">
-            <a:spAutoFit/>
-          </a:bodyPr>
-          <a:lstStyle/>
-          <a:p>
-            <a:pPr>
-              <a:defRPr sz="5400">
-                <a:latin typeface="Anonymous Pro for Powerline"/>
-                <a:ea typeface="Anonymous Pro for Powerline"/>
-                <a:cs typeface="Anonymous Pro for Powerline"/>
-                <a:sym typeface="Anonymous Pro for Powerline"/>
-              </a:defRPr>
-            </a:pPr>
-            <a:r>
-              <a:t>if condition_is_true:</a:t>
-            </a:r>
-          </a:p>
-          <a:p>
-            <a:pPr>
-              <a:defRPr sz="5400">
-                <a:latin typeface="Anonymous Pro for Powerline"/>
-                <a:ea typeface="Anonymous Pro for Powerline"/>
-                <a:cs typeface="Anonymous Pro for Powerline"/>
-                <a:sym typeface="Anonymous Pro for Powerline"/>
-              </a:defRPr>
-            </a:pPr>
-            <a:r>
-              <a:t>    print(“path #1 runs”)</a:t>
-            </a:r>
-          </a:p>
-          <a:p>
-            <a:pPr>
-              <a:defRPr sz="5400">
-                <a:latin typeface="Anonymous Pro for Powerline"/>
-                <a:ea typeface="Anonymous Pro for Powerline"/>
-                <a:cs typeface="Anonymous Pro for Powerline"/>
-                <a:sym typeface="Anonymous Pro for Powerline"/>
-              </a:defRPr>
-            </a:pPr>
-            <a:r>
-              <a:t>else:</a:t>
-            </a:r>
-          </a:p>
-          <a:p>
-            <a:pPr>
-              <a:defRPr sz="5400">
-                <a:latin typeface="Anonymous Pro for Powerline"/>
-                <a:ea typeface="Anonymous Pro for Powerline"/>
-                <a:cs typeface="Anonymous Pro for Powerline"/>
-                <a:sym typeface="Anonymous Pro for Powerline"/>
-              </a:defRPr>
-            </a:pPr>
-            <a:r>
-              <a:t>    print(“path #2 runs”)</a:t>
-            </a:r>
           </a:p>
         </p:txBody>
       </p:sp>
@@ -9505,6 +9517,149 @@
         <p:nvSpPr>
           <p:cNvPr id="305" name="Shape 305"/>
           <p:cNvSpPr/>
+          <p:nvPr>
+            <p:ph type="title"/>
+          </p:nvPr>
+        </p:nvSpPr>
+        <p:spPr>
+          <a:xfrm>
+            <a:off x="406400" y="1536700"/>
+            <a:ext cx="12192000" cy="1169260"/>
+          </a:xfrm>
+          <a:prstGeom prst="rect">
+            <a:avLst/>
+          </a:prstGeom>
+        </p:spPr>
+        <p:txBody>
+          <a:bodyPr/>
+          <a:lstStyle>
+            <a:lvl1pPr defTabSz="403097">
+              <a:spcBef>
+                <a:spcPts val="1900"/>
+              </a:spcBef>
+              <a:defRPr sz="8280"/>
+            </a:lvl1pPr>
+          </a:lstStyle>
+          <a:p>
+            <a:pPr/>
+            <a:r>
+              <a:t>if-Else Statement</a:t>
+            </a:r>
+          </a:p>
+        </p:txBody>
+      </p:sp>
+      <p:sp>
+        <p:nvSpPr>
+          <p:cNvPr id="306" name="Shape 306"/>
+          <p:cNvSpPr/>
+          <p:nvPr/>
+        </p:nvSpPr>
+        <p:spPr>
+          <a:xfrm>
+            <a:off x="512083" y="3644899"/>
+            <a:ext cx="11562527" cy="4318001"/>
+          </a:xfrm>
+          <a:prstGeom prst="rect">
+            <a:avLst/>
+          </a:prstGeom>
+          <a:ln w="12700">
+            <a:miter lim="400000"/>
+          </a:ln>
+          <a:extLst>
+            <a:ext uri="{C572A759-6A51-4108-AA02-DFA0A04FC94B}">
+              <ma14:wrappingTextBoxFlag xmlns:ma14="http://schemas.microsoft.com/office/mac/drawingml/2011/main" val="1"/>
+            </a:ext>
+          </a:extLst>
+        </p:spPr>
+        <p:txBody>
+          <a:bodyPr lIns="50800" tIns="50800" rIns="50800" bIns="50800" anchor="ctr">
+            <a:spAutoFit/>
+          </a:bodyPr>
+          <a:lstStyle/>
+          <a:p>
+            <a:pPr>
+              <a:defRPr sz="5400">
+                <a:latin typeface="Anonymous Pro for Powerline"/>
+                <a:ea typeface="Anonymous Pro for Powerline"/>
+                <a:cs typeface="Anonymous Pro for Powerline"/>
+                <a:sym typeface="Anonymous Pro for Powerline"/>
+              </a:defRPr>
+            </a:pPr>
+            <a:r>
+              <a:t>if condition_is_true:</a:t>
+            </a:r>
+          </a:p>
+          <a:p>
+            <a:pPr>
+              <a:defRPr sz="5400">
+                <a:latin typeface="Anonymous Pro for Powerline"/>
+                <a:ea typeface="Anonymous Pro for Powerline"/>
+                <a:cs typeface="Anonymous Pro for Powerline"/>
+                <a:sym typeface="Anonymous Pro for Powerline"/>
+              </a:defRPr>
+            </a:pPr>
+            <a:r>
+              <a:t>    print(“path #1 runs”)</a:t>
+            </a:r>
+          </a:p>
+          <a:p>
+            <a:pPr>
+              <a:defRPr sz="5400">
+                <a:latin typeface="Anonymous Pro for Powerline"/>
+                <a:ea typeface="Anonymous Pro for Powerline"/>
+                <a:cs typeface="Anonymous Pro for Powerline"/>
+                <a:sym typeface="Anonymous Pro for Powerline"/>
+              </a:defRPr>
+            </a:pPr>
+            <a:r>
+              <a:t>else:</a:t>
+            </a:r>
+          </a:p>
+          <a:p>
+            <a:pPr>
+              <a:defRPr sz="5400">
+                <a:latin typeface="Anonymous Pro for Powerline"/>
+                <a:ea typeface="Anonymous Pro for Powerline"/>
+                <a:cs typeface="Anonymous Pro for Powerline"/>
+                <a:sym typeface="Anonymous Pro for Powerline"/>
+              </a:defRPr>
+            </a:pPr>
+            <a:r>
+              <a:t>    print(“path #2 runs”)</a:t>
+            </a:r>
+          </a:p>
+        </p:txBody>
+      </p:sp>
+    </p:spTree>
+  </p:cSld>
+  <p:clrMapOvr>
+    <a:masterClrMapping/>
+  </p:clrMapOvr>
+  <p:transition xmlns:p14="http://schemas.microsoft.com/office/powerpoint/2010/main" spd="med" advClick="1"/>
+</p:sld>
+</file>
+
+<file path=ppt/slides/slide31.xml><?xml version="1.0" encoding="utf-8"?>
+<p:sld xmlns:a="http://schemas.openxmlformats.org/drawingml/2006/main" xmlns:r="http://schemas.openxmlformats.org/officeDocument/2006/relationships" xmlns:p="http://schemas.openxmlformats.org/presentationml/2006/main" showMasterSp="1" showMasterPhAnim="1">
+  <p:cSld>
+    <p:spTree>
+      <p:nvGrpSpPr>
+        <p:cNvPr id="1" name=""/>
+        <p:cNvGrpSpPr/>
+        <p:nvPr/>
+      </p:nvGrpSpPr>
+      <p:grpSpPr>
+        <a:xfrm>
+          <a:off x="0" y="0"/>
+          <a:ext cx="0" cy="0"/>
+          <a:chOff x="0" y="0"/>
+          <a:chExt cx="0" cy="0"/>
+        </a:xfrm>
+      </p:grpSpPr>
+      <p:sp>
+        <p:nvSpPr>
+          <p:cNvPr id="308" name="Shape 308"/>
+          <p:cNvSpPr/>
           <p:nvPr/>
         </p:nvSpPr>
         <p:spPr>
@@ -9551,7 +9706,7 @@
       </p:sp>
       <p:sp>
         <p:nvSpPr>
-          <p:cNvPr id="306" name="Shape 306"/>
+          <p:cNvPr id="309" name="Shape 309"/>
           <p:cNvSpPr/>
           <p:nvPr/>
         </p:nvSpPr>
@@ -9596,7 +9751,7 @@
       </p:sp>
       <p:sp>
         <p:nvSpPr>
-          <p:cNvPr id="307" name="Shape 307"/>
+          <p:cNvPr id="310" name="Shape 310"/>
           <p:cNvSpPr/>
           <p:nvPr/>
         </p:nvSpPr>
@@ -9641,7 +9796,7 @@
       </p:sp>
       <p:sp>
         <p:nvSpPr>
-          <p:cNvPr id="308" name="Shape 308"/>
+          <p:cNvPr id="311" name="Shape 311"/>
           <p:cNvSpPr/>
           <p:nvPr/>
         </p:nvSpPr>
@@ -9689,7 +9844,7 @@
       </p:sp>
       <p:sp>
         <p:nvSpPr>
-          <p:cNvPr id="309" name="Shape 309"/>
+          <p:cNvPr id="312" name="Shape 312"/>
           <p:cNvSpPr/>
           <p:nvPr/>
         </p:nvSpPr>
@@ -9737,7 +9892,7 @@
       </p:sp>
       <p:sp>
         <p:nvSpPr>
-          <p:cNvPr id="310" name="Shape 310"/>
+          <p:cNvPr id="313" name="Shape 313"/>
           <p:cNvSpPr/>
           <p:nvPr>
             <p:ph type="title" idx="4294967295"/>
@@ -9772,7 +9927,7 @@
       </p:sp>
       <p:sp>
         <p:nvSpPr>
-          <p:cNvPr id="311" name="Shape 311"/>
+          <p:cNvPr id="314" name="Shape 314"/>
           <p:cNvSpPr/>
           <p:nvPr/>
         </p:nvSpPr>
@@ -9851,7 +10006,7 @@
       </p:sp>
       <p:sp>
         <p:nvSpPr>
-          <p:cNvPr id="312" name="Shape 312"/>
+          <p:cNvPr id="315" name="Shape 315"/>
           <p:cNvSpPr/>
           <p:nvPr/>
         </p:nvSpPr>
@@ -9899,7 +10054,7 @@
       </p:sp>
       <p:sp>
         <p:nvSpPr>
-          <p:cNvPr id="313" name="Shape 313"/>
+          <p:cNvPr id="316" name="Shape 316"/>
           <p:cNvSpPr/>
           <p:nvPr/>
         </p:nvSpPr>
@@ -9944,7 +10099,7 @@
       </p:sp>
       <p:sp>
         <p:nvSpPr>
-          <p:cNvPr id="314" name="Shape 314"/>
+          <p:cNvPr id="317" name="Shape 317"/>
           <p:cNvSpPr/>
           <p:nvPr/>
         </p:nvSpPr>
@@ -9992,7 +10147,7 @@
       </p:sp>
       <p:sp>
         <p:nvSpPr>
-          <p:cNvPr id="315" name="Shape 315"/>
+          <p:cNvPr id="318" name="Shape 318"/>
           <p:cNvSpPr/>
           <p:nvPr/>
         </p:nvSpPr>
@@ -10040,7 +10195,7 @@
       </p:sp>
       <p:sp>
         <p:nvSpPr>
-          <p:cNvPr id="316" name="Shape 316"/>
+          <p:cNvPr id="319" name="Shape 319"/>
           <p:cNvSpPr/>
           <p:nvPr/>
         </p:nvSpPr>
@@ -10088,7 +10243,7 @@
       </p:sp>
       <p:sp>
         <p:nvSpPr>
-          <p:cNvPr id="317" name="Shape 317"/>
+          <p:cNvPr id="320" name="Shape 320"/>
           <p:cNvSpPr/>
           <p:nvPr/>
         </p:nvSpPr>
@@ -10136,7 +10291,7 @@
       </p:sp>
       <p:sp>
         <p:nvSpPr>
-          <p:cNvPr id="318" name="Shape 318"/>
+          <p:cNvPr id="321" name="Shape 321"/>
           <p:cNvSpPr/>
           <p:nvPr/>
         </p:nvSpPr>
@@ -10184,7 +10339,7 @@
       </p:sp>
       <p:sp>
         <p:nvSpPr>
-          <p:cNvPr id="319" name="Shape 319"/>
+          <p:cNvPr id="322" name="Shape 322"/>
           <p:cNvSpPr/>
           <p:nvPr/>
         </p:nvSpPr>
@@ -10229,7 +10384,7 @@
       </p:sp>
       <p:sp>
         <p:nvSpPr>
-          <p:cNvPr id="320" name="Shape 320"/>
+          <p:cNvPr id="323" name="Shape 323"/>
           <p:cNvSpPr/>
           <p:nvPr/>
         </p:nvSpPr>
@@ -10277,7 +10432,7 @@
       </p:sp>
       <p:sp>
         <p:nvSpPr>
-          <p:cNvPr id="321" name="Shape 321"/>
+          <p:cNvPr id="324" name="Shape 324"/>
           <p:cNvSpPr/>
           <p:nvPr/>
         </p:nvSpPr>
@@ -10325,7 +10480,7 @@
       </p:sp>
       <p:sp>
         <p:nvSpPr>
-          <p:cNvPr id="322" name="Shape 322"/>
+          <p:cNvPr id="325" name="Shape 325"/>
           <p:cNvSpPr/>
           <p:nvPr/>
         </p:nvSpPr>
@@ -10368,208 +10523,6 @@
                 <a:sym typeface="DIN Condensed"/>
               </a:defRPr>
             </a:pPr>
-          </a:p>
-        </p:txBody>
-      </p:sp>
-    </p:spTree>
-  </p:cSld>
-  <p:clrMapOvr>
-    <a:masterClrMapping/>
-  </p:clrMapOvr>
-  <p:transition xmlns:p14="http://schemas.microsoft.com/office/powerpoint/2010/main" spd="med" advClick="1"/>
-</p:sld>
-</file>
-
-<file path=ppt/slides/slide31.xml><?xml version="1.0" encoding="utf-8"?>
-<p:sld xmlns:a="http://schemas.openxmlformats.org/drawingml/2006/main" xmlns:r="http://schemas.openxmlformats.org/officeDocument/2006/relationships" xmlns:p="http://schemas.openxmlformats.org/presentationml/2006/main" showMasterSp="1" showMasterPhAnim="1">
-  <p:cSld>
-    <p:spTree>
-      <p:nvGrpSpPr>
-        <p:cNvPr id="1" name=""/>
-        <p:cNvGrpSpPr/>
-        <p:nvPr/>
-      </p:nvGrpSpPr>
-      <p:grpSpPr>
-        <a:xfrm>
-          <a:off x="0" y="0"/>
-          <a:ext cx="0" cy="0"/>
-          <a:chOff x="0" y="0"/>
-          <a:chExt cx="0" cy="0"/>
-        </a:xfrm>
-      </p:grpSpPr>
-      <p:sp>
-        <p:nvSpPr>
-          <p:cNvPr id="324" name="Shape 324"/>
-          <p:cNvSpPr/>
-          <p:nvPr>
-            <p:ph type="title"/>
-          </p:nvPr>
-        </p:nvSpPr>
-        <p:spPr>
-          <a:xfrm>
-            <a:off x="406400" y="1536700"/>
-            <a:ext cx="12192000" cy="1169260"/>
-          </a:xfrm>
-          <a:prstGeom prst="rect">
-            <a:avLst/>
-          </a:prstGeom>
-        </p:spPr>
-        <p:txBody>
-          <a:bodyPr/>
-          <a:lstStyle>
-            <a:lvl1pPr defTabSz="403097">
-              <a:spcBef>
-                <a:spcPts val="1900"/>
-              </a:spcBef>
-              <a:defRPr sz="8280"/>
-            </a:lvl1pPr>
-          </a:lstStyle>
-          <a:p>
-            <a:pPr/>
-            <a:r>
-              <a:t>if-elif-Else Statement</a:t>
-            </a:r>
-          </a:p>
-        </p:txBody>
-      </p:sp>
-      <p:sp>
-        <p:nvSpPr>
-          <p:cNvPr id="325" name="Shape 325"/>
-          <p:cNvSpPr/>
-          <p:nvPr/>
-        </p:nvSpPr>
-        <p:spPr>
-          <a:xfrm>
-            <a:off x="721137" y="3236537"/>
-            <a:ext cx="11562527" cy="5664201"/>
-          </a:xfrm>
-          <a:prstGeom prst="rect">
-            <a:avLst/>
-          </a:prstGeom>
-          <a:ln w="12700">
-            <a:miter lim="400000"/>
-          </a:ln>
-          <a:extLst>
-            <a:ext uri="{C572A759-6A51-4108-AA02-DFA0A04FC94B}">
-              <ma14:wrappingTextBoxFlag xmlns:ma14="http://schemas.microsoft.com/office/mac/drawingml/2011/main" val="1"/>
-            </a:ext>
-          </a:extLst>
-        </p:spPr>
-        <p:txBody>
-          <a:bodyPr lIns="50800" tIns="50800" rIns="50800" bIns="50800" anchor="ctr">
-            <a:spAutoFit/>
-          </a:bodyPr>
-          <a:lstStyle/>
-          <a:p>
-            <a:pPr>
-              <a:defRPr sz="4400">
-                <a:latin typeface="Anonymous Pro for Powerline"/>
-                <a:ea typeface="Anonymous Pro for Powerline"/>
-                <a:cs typeface="Anonymous Pro for Powerline"/>
-                <a:sym typeface="Anonymous Pro for Powerline"/>
-              </a:defRPr>
-            </a:pPr>
-            <a:r>
-              <a:t>if condition_is_true:</a:t>
-            </a:r>
-          </a:p>
-          <a:p>
-            <a:pPr>
-              <a:defRPr sz="4400">
-                <a:latin typeface="Anonymous Pro for Powerline"/>
-                <a:ea typeface="Anonymous Pro for Powerline"/>
-                <a:cs typeface="Anonymous Pro for Powerline"/>
-                <a:sym typeface="Anonymous Pro for Powerline"/>
-              </a:defRPr>
-            </a:pPr>
-            <a:r>
-              <a:t>    print(“</a:t>
-            </a:r>
-            <a:r>
-              <a:rPr>
-                <a:solidFill>
-                  <a:schemeClr val="accent3"/>
-                </a:solidFill>
-              </a:rPr>
-              <a:t>path #1</a:t>
-            </a:r>
-            <a:r>
-              <a:t> runs”)</a:t>
-            </a:r>
-          </a:p>
-          <a:p>
-            <a:pPr>
-              <a:defRPr sz="4400">
-                <a:latin typeface="Anonymous Pro for Powerline"/>
-                <a:ea typeface="Anonymous Pro for Powerline"/>
-                <a:cs typeface="Anonymous Pro for Powerline"/>
-                <a:sym typeface="Anonymous Pro for Powerline"/>
-              </a:defRPr>
-            </a:pPr>
-            <a:r>
-              <a:t>elif second_condition_is_true:</a:t>
-            </a:r>
-          </a:p>
-          <a:p>
-            <a:pPr>
-              <a:defRPr sz="4400">
-                <a:latin typeface="Anonymous Pro for Powerline"/>
-                <a:ea typeface="Anonymous Pro for Powerline"/>
-                <a:cs typeface="Anonymous Pro for Powerline"/>
-                <a:sym typeface="Anonymous Pro for Powerline"/>
-              </a:defRPr>
-            </a:pPr>
-            <a:r>
-              <a:t>    print(“</a:t>
-            </a:r>
-            <a:r>
-              <a:rPr>
-                <a:solidFill>
-                  <a:schemeClr val="accent3"/>
-                </a:solidFill>
-              </a:rPr>
-              <a:t>path #2</a:t>
-            </a:r>
-            <a:r>
-              <a:t> runs”)</a:t>
-            </a:r>
-          </a:p>
-          <a:p>
-            <a:pPr>
-              <a:defRPr sz="4400">
-                <a:latin typeface="Anonymous Pro for Powerline"/>
-                <a:ea typeface="Anonymous Pro for Powerline"/>
-                <a:cs typeface="Anonymous Pro for Powerline"/>
-                <a:sym typeface="Anonymous Pro for Powerline"/>
-              </a:defRPr>
-            </a:pPr>
-            <a:r>
-              <a:t>else:</a:t>
-            </a:r>
-          </a:p>
-          <a:p>
-            <a:pPr>
-              <a:defRPr sz="4400">
-                <a:latin typeface="Anonymous Pro for Powerline"/>
-                <a:ea typeface="Anonymous Pro for Powerline"/>
-                <a:cs typeface="Anonymous Pro for Powerline"/>
-                <a:sym typeface="Anonymous Pro for Powerline"/>
-              </a:defRPr>
-            </a:pPr>
-            <a:r>
-              <a:t>    print(“</a:t>
-            </a:r>
-            <a:r>
-              <a:rPr>
-                <a:solidFill>
-                  <a:schemeClr val="accent3"/>
-                </a:solidFill>
-              </a:rPr>
-              <a:t>path #3</a:t>
-            </a:r>
-            <a:r>
-              <a:t> runs”)</a:t>
-            </a:r>
           </a:p>
         </p:txBody>
       </p:sp>
@@ -10604,13 +10557,13 @@
           <p:cNvPr id="327" name="Shape 327"/>
           <p:cNvSpPr/>
           <p:nvPr>
-            <p:ph type="title" idx="4294967295"/>
+            <p:ph type="title"/>
           </p:nvPr>
         </p:nvSpPr>
         <p:spPr>
           <a:xfrm>
-            <a:off x="3488828" y="714129"/>
-            <a:ext cx="6027144" cy="1417969"/>
+            <a:off x="406400" y="1536700"/>
+            <a:ext cx="12192000" cy="1169260"/>
           </a:xfrm>
           <a:prstGeom prst="rect">
             <a:avLst/>
@@ -10619,17 +10572,158 @@
         <p:txBody>
           <a:bodyPr/>
           <a:lstStyle>
-            <a:lvl1pPr defTabSz="438150">
+            <a:lvl1pPr defTabSz="403097">
               <a:spcBef>
-                <a:spcPts val="2100"/>
+                <a:spcPts val="1900"/>
               </a:spcBef>
-              <a:defRPr sz="9750"/>
+              <a:defRPr sz="8280"/>
             </a:lvl1pPr>
           </a:lstStyle>
           <a:p>
             <a:pPr/>
             <a:r>
-              <a:t>Flow Diagram</a:t>
+              <a:t>if-elif-Else Statement</a:t>
+            </a:r>
+          </a:p>
+        </p:txBody>
+      </p:sp>
+      <p:sp>
+        <p:nvSpPr>
+          <p:cNvPr id="328" name="Shape 328"/>
+          <p:cNvSpPr/>
+          <p:nvPr/>
+        </p:nvSpPr>
+        <p:spPr>
+          <a:xfrm>
+            <a:off x="721137" y="3236537"/>
+            <a:ext cx="11562527" cy="5664201"/>
+          </a:xfrm>
+          <a:prstGeom prst="rect">
+            <a:avLst/>
+          </a:prstGeom>
+          <a:ln w="12700">
+            <a:miter lim="400000"/>
+          </a:ln>
+          <a:extLst>
+            <a:ext uri="{C572A759-6A51-4108-AA02-DFA0A04FC94B}">
+              <ma14:wrappingTextBoxFlag xmlns:ma14="http://schemas.microsoft.com/office/mac/drawingml/2011/main" val="1"/>
+            </a:ext>
+          </a:extLst>
+        </p:spPr>
+        <p:txBody>
+          <a:bodyPr lIns="50800" tIns="50800" rIns="50800" bIns="50800" anchor="ctr">
+            <a:spAutoFit/>
+          </a:bodyPr>
+          <a:lstStyle/>
+          <a:p>
+            <a:pPr>
+              <a:defRPr sz="4400">
+                <a:latin typeface="Anonymous Pro for Powerline"/>
+                <a:ea typeface="Anonymous Pro for Powerline"/>
+                <a:cs typeface="Anonymous Pro for Powerline"/>
+                <a:sym typeface="Anonymous Pro for Powerline"/>
+              </a:defRPr>
+            </a:pPr>
+            <a:r>
+              <a:t>if condition_is_true:</a:t>
+            </a:r>
+          </a:p>
+          <a:p>
+            <a:pPr>
+              <a:defRPr sz="4400">
+                <a:latin typeface="Anonymous Pro for Powerline"/>
+                <a:ea typeface="Anonymous Pro for Powerline"/>
+                <a:cs typeface="Anonymous Pro for Powerline"/>
+                <a:sym typeface="Anonymous Pro for Powerline"/>
+              </a:defRPr>
+            </a:pPr>
+            <a:r>
+              <a:t>    print(“</a:t>
+            </a:r>
+            <a:r>
+              <a:rPr>
+                <a:solidFill>
+                  <a:schemeClr val="accent3"/>
+                </a:solidFill>
+              </a:rPr>
+              <a:t>path #1</a:t>
+            </a:r>
+            <a:r>
+              <a:t> runs”)</a:t>
+            </a:r>
+          </a:p>
+          <a:p>
+            <a:pPr>
+              <a:defRPr sz="4400">
+                <a:latin typeface="Anonymous Pro for Powerline"/>
+                <a:ea typeface="Anonymous Pro for Powerline"/>
+                <a:cs typeface="Anonymous Pro for Powerline"/>
+                <a:sym typeface="Anonymous Pro for Powerline"/>
+              </a:defRPr>
+            </a:pPr>
+            <a:r>
+              <a:t>elif second_condition_is_true:</a:t>
+            </a:r>
+          </a:p>
+          <a:p>
+            <a:pPr>
+              <a:defRPr sz="4400">
+                <a:latin typeface="Anonymous Pro for Powerline"/>
+                <a:ea typeface="Anonymous Pro for Powerline"/>
+                <a:cs typeface="Anonymous Pro for Powerline"/>
+                <a:sym typeface="Anonymous Pro for Powerline"/>
+              </a:defRPr>
+            </a:pPr>
+            <a:r>
+              <a:t>    print(“</a:t>
+            </a:r>
+            <a:r>
+              <a:rPr>
+                <a:solidFill>
+                  <a:schemeClr val="accent3"/>
+                </a:solidFill>
+              </a:rPr>
+              <a:t>path #2</a:t>
+            </a:r>
+            <a:r>
+              <a:t> runs”)</a:t>
+            </a:r>
+          </a:p>
+          <a:p>
+            <a:pPr>
+              <a:defRPr sz="4400">
+                <a:latin typeface="Anonymous Pro for Powerline"/>
+                <a:ea typeface="Anonymous Pro for Powerline"/>
+                <a:cs typeface="Anonymous Pro for Powerline"/>
+                <a:sym typeface="Anonymous Pro for Powerline"/>
+              </a:defRPr>
+            </a:pPr>
+            <a:r>
+              <a:t>else:</a:t>
+            </a:r>
+          </a:p>
+          <a:p>
+            <a:pPr>
+              <a:defRPr sz="4400">
+                <a:latin typeface="Anonymous Pro for Powerline"/>
+                <a:ea typeface="Anonymous Pro for Powerline"/>
+                <a:cs typeface="Anonymous Pro for Powerline"/>
+                <a:sym typeface="Anonymous Pro for Powerline"/>
+              </a:defRPr>
+            </a:pPr>
+            <a:r>
+              <a:t>    print(“</a:t>
+            </a:r>
+            <a:r>
+              <a:rPr>
+                <a:solidFill>
+                  <a:schemeClr val="accent3"/>
+                </a:solidFill>
+              </a:rPr>
+              <a:t>path #3</a:t>
+            </a:r>
+            <a:r>
+              <a:t> runs”)</a:t>
             </a:r>
           </a:p>
         </p:txBody>
@@ -10662,7 +10756,7 @@
       </p:grpSpPr>
       <p:sp>
         <p:nvSpPr>
-          <p:cNvPr id="329" name="Shape 329"/>
+          <p:cNvPr id="330" name="Shape 330"/>
           <p:cNvSpPr/>
           <p:nvPr>
             <p:ph type="title" idx="4294967295"/>
@@ -10692,96 +10786,6 @@
             <a:r>
               <a:t>Flow Diagram</a:t>
             </a:r>
-          </a:p>
-        </p:txBody>
-      </p:sp>
-      <p:sp>
-        <p:nvSpPr>
-          <p:cNvPr id="330" name="Shape 330"/>
-          <p:cNvSpPr/>
-          <p:nvPr/>
-        </p:nvSpPr>
-        <p:spPr>
-          <a:xfrm rot="2859210">
-            <a:off x="3768213" y="5333820"/>
-            <a:ext cx="5136049" cy="438151"/>
-          </a:xfrm>
-          <a:prstGeom prst="rect">
-            <a:avLst/>
-          </a:prstGeom>
-          <a:solidFill>
-            <a:schemeClr val="accent5"/>
-          </a:solidFill>
-          <a:ln w="12700">
-            <a:miter lim="400000"/>
-          </a:ln>
-        </p:spPr>
-        <p:txBody>
-          <a:bodyPr lIns="50800" tIns="50800" rIns="50800" bIns="50800" anchor="ctr"/>
-          <a:lstStyle/>
-          <a:p>
-            <a:pPr algn="ctr">
-              <a:lnSpc>
-                <a:spcPct val="80000"/>
-              </a:lnSpc>
-              <a:spcBef>
-                <a:spcPts val="0"/>
-              </a:spcBef>
-              <a:defRPr cap="all" sz="2800">
-                <a:solidFill>
-                  <a:srgbClr val="FFFFFF"/>
-                </a:solidFill>
-                <a:latin typeface="+mn-lt"/>
-                <a:ea typeface="+mn-ea"/>
-                <a:cs typeface="+mn-cs"/>
-                <a:sym typeface="DIN Condensed"/>
-              </a:defRPr>
-            </a:pPr>
-          </a:p>
-        </p:txBody>
-      </p:sp>
-      <p:sp>
-        <p:nvSpPr>
-          <p:cNvPr id="331" name="Shape 331"/>
-          <p:cNvSpPr/>
-          <p:nvPr/>
-        </p:nvSpPr>
-        <p:spPr>
-          <a:xfrm rot="18911602">
-            <a:off x="3742266" y="5284258"/>
-            <a:ext cx="5139400" cy="438151"/>
-          </a:xfrm>
-          <a:prstGeom prst="rect">
-            <a:avLst/>
-          </a:prstGeom>
-          <a:solidFill>
-            <a:schemeClr val="accent5"/>
-          </a:solidFill>
-          <a:ln w="12700">
-            <a:miter lim="400000"/>
-          </a:ln>
-        </p:spPr>
-        <p:txBody>
-          <a:bodyPr lIns="50800" tIns="50800" rIns="50800" bIns="50800" anchor="ctr"/>
-          <a:lstStyle/>
-          <a:p>
-            <a:pPr algn="ctr">
-              <a:lnSpc>
-                <a:spcPct val="80000"/>
-              </a:lnSpc>
-              <a:spcBef>
-                <a:spcPts val="0"/>
-              </a:spcBef>
-              <a:defRPr cap="all" sz="2800">
-                <a:solidFill>
-                  <a:srgbClr val="FFFFFF"/>
-                </a:solidFill>
-                <a:latin typeface="+mn-lt"/>
-                <a:ea typeface="+mn-ea"/>
-                <a:cs typeface="+mn-cs"/>
-                <a:sym typeface="DIN Condensed"/>
-              </a:defRPr>
-            </a:pPr>
           </a:p>
         </p:txBody>
       </p:sp>
@@ -10813,16 +10817,16 @@
       </p:grpSpPr>
       <p:sp>
         <p:nvSpPr>
-          <p:cNvPr id="333" name="Shape 333"/>
+          <p:cNvPr id="332" name="Shape 332"/>
           <p:cNvSpPr/>
           <p:nvPr>
-            <p:ph type="title"/>
+            <p:ph type="title" idx="4294967295"/>
           </p:nvPr>
         </p:nvSpPr>
         <p:spPr>
           <a:xfrm>
-            <a:off x="406400" y="1536700"/>
-            <a:ext cx="12192000" cy="1169260"/>
+            <a:off x="3488828" y="714129"/>
+            <a:ext cx="6027144" cy="1417969"/>
           </a:xfrm>
           <a:prstGeom prst="rect">
             <a:avLst/>
@@ -10831,77 +10835,108 @@
         <p:txBody>
           <a:bodyPr/>
           <a:lstStyle>
-            <a:lvl1pPr defTabSz="403097">
+            <a:lvl1pPr defTabSz="438150">
               <a:spcBef>
-                <a:spcPts val="1900"/>
+                <a:spcPts val="2100"/>
               </a:spcBef>
-              <a:defRPr sz="8280"/>
+              <a:defRPr sz="9750"/>
             </a:lvl1pPr>
           </a:lstStyle>
           <a:p>
             <a:pPr/>
             <a:r>
-              <a:t>Conditional Statements</a:t>
-            </a:r>
-          </a:p>
-        </p:txBody>
-      </p:sp>
-      <p:sp>
-        <p:nvSpPr>
-          <p:cNvPr id="334" name="Shape 334"/>
-          <p:cNvSpPr/>
-          <p:nvPr>
-            <p:ph type="body" sz="half" idx="1"/>
-          </p:nvPr>
-        </p:nvSpPr>
-        <p:spPr>
-          <a:xfrm>
-            <a:off x="406400" y="3953767"/>
-            <a:ext cx="12192000" cy="2531601"/>
-          </a:xfrm>
-          <a:prstGeom prst="rect">
-            <a:avLst/>
-          </a:prstGeom>
-        </p:spPr>
-        <p:txBody>
-          <a:bodyPr/>
+              <a:t>Flow Diagram</a:t>
+            </a:r>
+          </a:p>
+        </p:txBody>
+      </p:sp>
+      <p:sp>
+        <p:nvSpPr>
+          <p:cNvPr id="333" name="Shape 333"/>
+          <p:cNvSpPr/>
+          <p:nvPr/>
+        </p:nvSpPr>
+        <p:spPr>
+          <a:xfrm rot="2859210">
+            <a:off x="3768213" y="5333820"/>
+            <a:ext cx="5136049" cy="438151"/>
+          </a:xfrm>
+          <a:prstGeom prst="rect">
+            <a:avLst/>
+          </a:prstGeom>
+          <a:solidFill>
+            <a:schemeClr val="accent5"/>
+          </a:solidFill>
+          <a:ln w="12700">
+            <a:miter lim="400000"/>
+          </a:ln>
+        </p:spPr>
+        <p:txBody>
+          <a:bodyPr lIns="50800" tIns="50800" rIns="50800" bIns="50800" anchor="ctr"/>
           <a:lstStyle/>
           <a:p>
-            <a:pPr marL="663612" indent="-663612" defTabSz="549148">
-              <a:spcBef>
-                <a:spcPts val="2600"/>
-              </a:spcBef>
-              <a:buClrTx/>
-              <a:buSzPct val="40000"/>
-              <a:buFontTx/>
-              <a:buBlip>
-                <a:blip r:embed="rId2"/>
-              </a:buBlip>
-              <a:defRPr sz="6016"/>
-            </a:pPr>
-            <a:r>
-              <a:t>Directs route taken by program</a:t>
-            </a:r>
-          </a:p>
-          <a:p>
-            <a:pPr marL="663612" indent="-663612" defTabSz="549148">
+            <a:pPr algn="ctr">
               <a:lnSpc>
-                <a:spcPct val="200000"/>
+                <a:spcPct val="80000"/>
               </a:lnSpc>
               <a:spcBef>
-                <a:spcPts val="2600"/>
+                <a:spcPts val="0"/>
               </a:spcBef>
-              <a:buClrTx/>
-              <a:buSzPct val="40000"/>
-              <a:buFontTx/>
-              <a:buBlip>
-                <a:blip r:embed="rId2"/>
-              </a:buBlip>
-              <a:defRPr sz="6016"/>
+              <a:defRPr cap="all" sz="2800">
+                <a:solidFill>
+                  <a:srgbClr val="FFFFFF"/>
+                </a:solidFill>
+                <a:latin typeface="+mn-lt"/>
+                <a:ea typeface="+mn-ea"/>
+                <a:cs typeface="+mn-cs"/>
+                <a:sym typeface="DIN Condensed"/>
+              </a:defRPr>
             </a:pPr>
-            <a:r>
-              <a:t>Hinges on Boolean expressions</a:t>
-            </a:r>
+          </a:p>
+        </p:txBody>
+      </p:sp>
+      <p:sp>
+        <p:nvSpPr>
+          <p:cNvPr id="334" name="Shape 334"/>
+          <p:cNvSpPr/>
+          <p:nvPr/>
+        </p:nvSpPr>
+        <p:spPr>
+          <a:xfrm rot="18911602">
+            <a:off x="3742266" y="5284258"/>
+            <a:ext cx="5139400" cy="438151"/>
+          </a:xfrm>
+          <a:prstGeom prst="rect">
+            <a:avLst/>
+          </a:prstGeom>
+          <a:solidFill>
+            <a:schemeClr val="accent5"/>
+          </a:solidFill>
+          <a:ln w="12700">
+            <a:miter lim="400000"/>
+          </a:ln>
+        </p:spPr>
+        <p:txBody>
+          <a:bodyPr lIns="50800" tIns="50800" rIns="50800" bIns="50800" anchor="ctr"/>
+          <a:lstStyle/>
+          <a:p>
+            <a:pPr algn="ctr">
+              <a:lnSpc>
+                <a:spcPct val="80000"/>
+              </a:lnSpc>
+              <a:spcBef>
+                <a:spcPts val="0"/>
+              </a:spcBef>
+              <a:defRPr cap="all" sz="2800">
+                <a:solidFill>
+                  <a:srgbClr val="FFFFFF"/>
+                </a:solidFill>
+                <a:latin typeface="+mn-lt"/>
+                <a:ea typeface="+mn-ea"/>
+                <a:cs typeface="+mn-cs"/>
+                <a:sym typeface="DIN Condensed"/>
+              </a:defRPr>
+            </a:pPr>
           </a:p>
         </p:txBody>
       </p:sp>
@@ -10941,8 +10976,43 @@
         </p:nvSpPr>
         <p:spPr>
           <a:xfrm>
-            <a:off x="2802102" y="4038600"/>
-            <a:ext cx="7400596" cy="4521200"/>
+            <a:off x="406400" y="1536700"/>
+            <a:ext cx="12192000" cy="1169260"/>
+          </a:xfrm>
+          <a:prstGeom prst="rect">
+            <a:avLst/>
+          </a:prstGeom>
+        </p:spPr>
+        <p:txBody>
+          <a:bodyPr/>
+          <a:lstStyle>
+            <a:lvl1pPr defTabSz="403097">
+              <a:spcBef>
+                <a:spcPts val="1900"/>
+              </a:spcBef>
+              <a:defRPr sz="8280"/>
+            </a:lvl1pPr>
+          </a:lstStyle>
+          <a:p>
+            <a:pPr/>
+            <a:r>
+              <a:t>Conditional Statements</a:t>
+            </a:r>
+          </a:p>
+        </p:txBody>
+      </p:sp>
+      <p:sp>
+        <p:nvSpPr>
+          <p:cNvPr id="337" name="Shape 337"/>
+          <p:cNvSpPr/>
+          <p:nvPr>
+            <p:ph type="body" sz="half" idx="1"/>
+          </p:nvPr>
+        </p:nvSpPr>
+        <p:spPr>
+          <a:xfrm>
+            <a:off x="406400" y="3953767"/>
+            <a:ext cx="12192000" cy="2531601"/>
           </a:xfrm>
           <a:prstGeom prst="rect">
             <a:avLst/>
@@ -10952,9 +11022,40 @@
           <a:bodyPr/>
           <a:lstStyle/>
           <a:p>
-            <a:pPr/>
-            <a:r>
-              <a:t>Exercises</a:t>
+            <a:pPr marL="663612" indent="-663612" defTabSz="549148">
+              <a:spcBef>
+                <a:spcPts val="2600"/>
+              </a:spcBef>
+              <a:buClrTx/>
+              <a:buSzPct val="40000"/>
+              <a:buFontTx/>
+              <a:buBlip>
+                <a:blip r:embed="rId2"/>
+              </a:buBlip>
+              <a:defRPr sz="6016"/>
+            </a:pPr>
+            <a:r>
+              <a:t>Directs route taken by program</a:t>
+            </a:r>
+          </a:p>
+          <a:p>
+            <a:pPr marL="663612" indent="-663612" defTabSz="549148">
+              <a:lnSpc>
+                <a:spcPct val="200000"/>
+              </a:lnSpc>
+              <a:spcBef>
+                <a:spcPts val="2600"/>
+              </a:spcBef>
+              <a:buClrTx/>
+              <a:buSzPct val="40000"/>
+              <a:buFontTx/>
+              <a:buBlip>
+                <a:blip r:embed="rId2"/>
+              </a:buBlip>
+              <a:defRPr sz="6016"/>
+            </a:pPr>
+            <a:r>
+              <a:t>Hinges on Boolean expressions</a:t>
             </a:r>
           </a:p>
         </p:txBody>
@@ -10987,7 +11088,7 @@
       </p:grpSpPr>
       <p:sp>
         <p:nvSpPr>
-          <p:cNvPr id="338" name="Shape 338"/>
+          <p:cNvPr id="339" name="Shape 339"/>
           <p:cNvSpPr/>
           <p:nvPr>
             <p:ph type="title"/>
@@ -10995,43 +11096,8 @@
         </p:nvSpPr>
         <p:spPr>
           <a:xfrm>
-            <a:off x="406400" y="1536700"/>
-            <a:ext cx="12192000" cy="1169260"/>
-          </a:xfrm>
-          <a:prstGeom prst="rect">
-            <a:avLst/>
-          </a:prstGeom>
-        </p:spPr>
-        <p:txBody>
-          <a:bodyPr/>
-          <a:lstStyle>
-            <a:lvl1pPr defTabSz="403097">
-              <a:spcBef>
-                <a:spcPts val="1900"/>
-              </a:spcBef>
-              <a:defRPr sz="8280"/>
-            </a:lvl1pPr>
-          </a:lstStyle>
-          <a:p>
-            <a:pPr/>
-            <a:r>
-              <a:t>For-Loops</a:t>
-            </a:r>
-          </a:p>
-        </p:txBody>
-      </p:sp>
-      <p:sp>
-        <p:nvSpPr>
-          <p:cNvPr id="339" name="Shape 339"/>
-          <p:cNvSpPr/>
-          <p:nvPr>
-            <p:ph type="body" sz="half" idx="1"/>
-          </p:nvPr>
-        </p:nvSpPr>
-        <p:spPr>
-          <a:xfrm>
-            <a:off x="406400" y="3953767"/>
-            <a:ext cx="12192000" cy="2531601"/>
+            <a:off x="2802102" y="4038600"/>
+            <a:ext cx="7400596" cy="4521200"/>
           </a:xfrm>
           <a:prstGeom prst="rect">
             <a:avLst/>
@@ -11041,40 +11107,9 @@
           <a:bodyPr/>
           <a:lstStyle/>
           <a:p>
-            <a:pPr marL="649492" indent="-649492" defTabSz="537463">
-              <a:spcBef>
-                <a:spcPts val="2500"/>
-              </a:spcBef>
-              <a:buClrTx/>
-              <a:buSzPct val="40000"/>
-              <a:buFontTx/>
-              <a:buBlip>
-                <a:blip r:embed="rId2"/>
-              </a:buBlip>
-              <a:defRPr sz="5888"/>
-            </a:pPr>
-            <a:r>
-              <a:t>Repeats a chunk of code</a:t>
-            </a:r>
-          </a:p>
-          <a:p>
-            <a:pPr marL="649492" indent="-649492" defTabSz="537463">
-              <a:lnSpc>
-                <a:spcPct val="200000"/>
-              </a:lnSpc>
-              <a:spcBef>
-                <a:spcPts val="2500"/>
-              </a:spcBef>
-              <a:buClrTx/>
-              <a:buSzPct val="40000"/>
-              <a:buFontTx/>
-              <a:buBlip>
-                <a:blip r:embed="rId2"/>
-              </a:buBlip>
-              <a:defRPr sz="5888"/>
-            </a:pPr>
-            <a:r>
-              <a:t>Hands in different item each time</a:t>
+            <a:pPr/>
+            <a:r>
+              <a:t>Exercises</a:t>
             </a:r>
           </a:p>
         </p:txBody>
@@ -11110,13 +11145,13 @@
           <p:cNvPr id="341" name="Shape 341"/>
           <p:cNvSpPr/>
           <p:nvPr>
-            <p:ph type="title" idx="4294967295"/>
+            <p:ph type="title"/>
           </p:nvPr>
         </p:nvSpPr>
         <p:spPr>
           <a:xfrm>
-            <a:off x="644028" y="714129"/>
-            <a:ext cx="6027144" cy="1417969"/>
+            <a:off x="406400" y="1536700"/>
+            <a:ext cx="12192000" cy="1169260"/>
           </a:xfrm>
           <a:prstGeom prst="rect">
             <a:avLst/>
@@ -11125,17 +11160,17 @@
         <p:txBody>
           <a:bodyPr/>
           <a:lstStyle>
-            <a:lvl1pPr defTabSz="461518">
+            <a:lvl1pPr defTabSz="403097">
               <a:spcBef>
-                <a:spcPts val="2200"/>
+                <a:spcPts val="1900"/>
               </a:spcBef>
-              <a:defRPr sz="10270"/>
+              <a:defRPr sz="8280"/>
             </a:lvl1pPr>
           </a:lstStyle>
           <a:p>
             <a:pPr/>
             <a:r>
-              <a:t>For-loops</a:t>
+              <a:t>For-Loops</a:t>
             </a:r>
           </a:p>
         </p:txBody>
@@ -11144,67 +11179,57 @@
         <p:nvSpPr>
           <p:cNvPr id="342" name="Shape 342"/>
           <p:cNvSpPr/>
-          <p:nvPr/>
-        </p:nvSpPr>
-        <p:spPr>
-          <a:xfrm>
-            <a:off x="579816" y="3435350"/>
-            <a:ext cx="12116101" cy="3187701"/>
-          </a:xfrm>
-          <a:prstGeom prst="rect">
-            <a:avLst/>
-          </a:prstGeom>
-          <a:ln w="12700">
-            <a:miter lim="400000"/>
-          </a:ln>
-          <a:extLst>
-            <a:ext uri="{C572A759-6A51-4108-AA02-DFA0A04FC94B}">
-              <ma14:wrappingTextBoxFlag xmlns:ma14="http://schemas.microsoft.com/office/mac/drawingml/2011/main" val="1"/>
-            </a:ext>
-          </a:extLst>
-        </p:spPr>
-        <p:txBody>
-          <a:bodyPr lIns="50800" tIns="50800" rIns="50800" bIns="50800" anchor="ctr">
-            <a:spAutoFit/>
-          </a:bodyPr>
+          <p:nvPr>
+            <p:ph type="body" sz="half" idx="1"/>
+          </p:nvPr>
+        </p:nvSpPr>
+        <p:spPr>
+          <a:xfrm>
+            <a:off x="406400" y="3953767"/>
+            <a:ext cx="12192000" cy="2531601"/>
+          </a:xfrm>
+          <a:prstGeom prst="rect">
+            <a:avLst/>
+          </a:prstGeom>
+        </p:spPr>
+        <p:txBody>
+          <a:bodyPr/>
           <a:lstStyle/>
           <a:p>
-            <a:pPr>
-              <a:defRPr sz="5400">
-                <a:latin typeface="Anonymous Pro for Powerline"/>
-                <a:ea typeface="Anonymous Pro for Powerline"/>
-                <a:cs typeface="Anonymous Pro for Powerline"/>
-                <a:sym typeface="Anonymous Pro for Powerline"/>
-              </a:defRPr>
+            <a:pPr marL="649492" indent="-649492" defTabSz="537463">
+              <a:spcBef>
+                <a:spcPts val="2500"/>
+              </a:spcBef>
+              <a:buClrTx/>
+              <a:buSzPct val="40000"/>
+              <a:buFontTx/>
+              <a:buBlip>
+                <a:blip r:embed="rId2"/>
+              </a:buBlip>
+              <a:defRPr sz="5888"/>
             </a:pPr>
             <a:r>
-              <a:t>pets = [“dog”, “cat”, “fish”]</a:t>
-            </a:r>
-          </a:p>
-          <a:p>
-            <a:pPr>
-              <a:defRPr sz="5400">
-                <a:latin typeface="Anonymous Pro for Powerline"/>
-                <a:ea typeface="Anonymous Pro for Powerline"/>
-                <a:cs typeface="Anonymous Pro for Powerline"/>
-                <a:sym typeface="Anonymous Pro for Powerline"/>
-              </a:defRPr>
+              <a:t>Repeats a chunk of code</a:t>
+            </a:r>
+          </a:p>
+          <a:p>
+            <a:pPr marL="649492" indent="-649492" defTabSz="537463">
+              <a:lnSpc>
+                <a:spcPct val="200000"/>
+              </a:lnSpc>
+              <a:spcBef>
+                <a:spcPts val="2500"/>
+              </a:spcBef>
+              <a:buClrTx/>
+              <a:buSzPct val="40000"/>
+              <a:buFontTx/>
+              <a:buBlip>
+                <a:blip r:embed="rId2"/>
+              </a:buBlip>
+              <a:defRPr sz="5888"/>
             </a:pPr>
             <a:r>
-              <a:t>for pet in pets:</a:t>
-            </a:r>
-          </a:p>
-          <a:p>
-            <a:pPr>
-              <a:defRPr sz="5400">
-                <a:latin typeface="Anonymous Pro for Powerline"/>
-                <a:ea typeface="Anonymous Pro for Powerline"/>
-                <a:cs typeface="Anonymous Pro for Powerline"/>
-                <a:sym typeface="Anonymous Pro for Powerline"/>
-              </a:defRPr>
-            </a:pPr>
-            <a:r>
-              <a:t>    print(pet)</a:t>
+              <a:t>Hands in different item each time</a:t>
             </a:r>
           </a:p>
         </p:txBody>
@@ -11278,8 +11303,8 @@
         </p:nvSpPr>
         <p:spPr>
           <a:xfrm>
-            <a:off x="579816" y="2666999"/>
-            <a:ext cx="12116101" cy="6045201"/>
+            <a:off x="579816" y="3435350"/>
+            <a:ext cx="12116101" cy="3187701"/>
           </a:xfrm>
           <a:prstGeom prst="rect">
             <a:avLst/>
@@ -11300,7 +11325,7 @@
           <a:lstStyle/>
           <a:p>
             <a:pPr>
-              <a:defRPr sz="4800">
+              <a:defRPr sz="5400">
                 <a:latin typeface="Anonymous Pro for Powerline"/>
                 <a:ea typeface="Anonymous Pro for Powerline"/>
                 <a:cs typeface="Anonymous Pro for Powerline"/>
@@ -11313,7 +11338,7 @@
           </a:p>
           <a:p>
             <a:pPr>
-              <a:defRPr sz="4800">
+              <a:defRPr sz="5400">
                 <a:latin typeface="Anonymous Pro for Powerline"/>
                 <a:ea typeface="Anonymous Pro for Powerline"/>
                 <a:cs typeface="Anonymous Pro for Powerline"/>
@@ -11326,7 +11351,7 @@
           </a:p>
           <a:p>
             <a:pPr>
-              <a:defRPr sz="4800">
+              <a:defRPr sz="5400">
                 <a:latin typeface="Anonymous Pro for Powerline"/>
                 <a:ea typeface="Anonymous Pro for Powerline"/>
                 <a:cs typeface="Anonymous Pro for Powerline"/>
@@ -11334,62 +11359,7 @@
               </a:defRPr>
             </a:pPr>
             <a:r>
-              <a:t>    </a:t>
-            </a:r>
-            <a:r>
-              <a:rPr>
-                <a:solidFill>
-                  <a:schemeClr val="accent3"/>
-                </a:solidFill>
-              </a:rPr>
-              <a:t>if pet == “dog”:</a:t>
-            </a:r>
-          </a:p>
-          <a:p>
-            <a:pPr>
-              <a:defRPr sz="4800">
-                <a:latin typeface="Anonymous Pro for Powerline"/>
-                <a:ea typeface="Anonymous Pro for Powerline"/>
-                <a:cs typeface="Anonymous Pro for Powerline"/>
-                <a:sym typeface="Anonymous Pro for Powerline"/>
-              </a:defRPr>
-            </a:pPr>
-            <a:r>
-              <a:t>        print(“Man’s best friend!”)</a:t>
-            </a:r>
-          </a:p>
-          <a:p>
-            <a:pPr>
-              <a:defRPr sz="4800">
-                <a:latin typeface="Anonymous Pro for Powerline"/>
-                <a:ea typeface="Anonymous Pro for Powerline"/>
-                <a:cs typeface="Anonymous Pro for Powerline"/>
-                <a:sym typeface="Anonymous Pro for Powerline"/>
-              </a:defRPr>
-            </a:pPr>
-            <a:r>
-              <a:t>    </a:t>
-            </a:r>
-            <a:r>
-              <a:rPr>
-                <a:solidFill>
-                  <a:schemeClr val="accent3"/>
-                </a:solidFill>
-              </a:rPr>
-              <a:t>else:</a:t>
-            </a:r>
-          </a:p>
-          <a:p>
-            <a:pPr>
-              <a:defRPr sz="4800">
-                <a:latin typeface="Anonymous Pro for Powerline"/>
-                <a:ea typeface="Anonymous Pro for Powerline"/>
-                <a:cs typeface="Anonymous Pro for Powerline"/>
-                <a:sym typeface="Anonymous Pro for Powerline"/>
-              </a:defRPr>
-            </a:pPr>
-            <a:r>
-              <a:t>        print(“whatever”)</a:t>
+              <a:t>    print(pet)</a:t>
             </a:r>
           </a:p>
         </p:txBody>
@@ -11425,13 +11395,13 @@
           <p:cNvPr id="347" name="Shape 347"/>
           <p:cNvSpPr/>
           <p:nvPr>
-            <p:ph type="title"/>
+            <p:ph type="title" idx="4294967295"/>
           </p:nvPr>
         </p:nvSpPr>
         <p:spPr>
           <a:xfrm>
-            <a:off x="406400" y="1536700"/>
-            <a:ext cx="12192000" cy="1169260"/>
+            <a:off x="644028" y="714129"/>
+            <a:ext cx="6027144" cy="1417969"/>
           </a:xfrm>
           <a:prstGeom prst="rect">
             <a:avLst/>
@@ -11440,17 +11410,17 @@
         <p:txBody>
           <a:bodyPr/>
           <a:lstStyle>
-            <a:lvl1pPr defTabSz="403097">
+            <a:lvl1pPr defTabSz="461518">
               <a:spcBef>
-                <a:spcPts val="1900"/>
+                <a:spcPts val="2200"/>
               </a:spcBef>
-              <a:defRPr sz="8280"/>
+              <a:defRPr sz="10270"/>
             </a:lvl1pPr>
           </a:lstStyle>
           <a:p>
             <a:pPr/>
             <a:r>
-              <a:t>For-Loops</a:t>
+              <a:t>For-loops</a:t>
             </a:r>
           </a:p>
         </p:txBody>
@@ -11459,57 +11429,122 @@
         <p:nvSpPr>
           <p:cNvPr id="348" name="Shape 348"/>
           <p:cNvSpPr/>
-          <p:nvPr>
-            <p:ph type="body" sz="half" idx="1"/>
-          </p:nvPr>
-        </p:nvSpPr>
-        <p:spPr>
-          <a:xfrm>
-            <a:off x="406400" y="3953767"/>
-            <a:ext cx="12192000" cy="2531601"/>
-          </a:xfrm>
-          <a:prstGeom prst="rect">
-            <a:avLst/>
-          </a:prstGeom>
-        </p:spPr>
-        <p:txBody>
-          <a:bodyPr/>
+          <p:nvPr/>
+        </p:nvSpPr>
+        <p:spPr>
+          <a:xfrm>
+            <a:off x="579816" y="2666999"/>
+            <a:ext cx="12116101" cy="6045201"/>
+          </a:xfrm>
+          <a:prstGeom prst="rect">
+            <a:avLst/>
+          </a:prstGeom>
+          <a:ln w="12700">
+            <a:miter lim="400000"/>
+          </a:ln>
+          <a:extLst>
+            <a:ext uri="{C572A759-6A51-4108-AA02-DFA0A04FC94B}">
+              <ma14:wrappingTextBoxFlag xmlns:ma14="http://schemas.microsoft.com/office/mac/drawingml/2011/main" val="1"/>
+            </a:ext>
+          </a:extLst>
+        </p:spPr>
+        <p:txBody>
+          <a:bodyPr lIns="50800" tIns="50800" rIns="50800" bIns="50800" anchor="ctr">
+            <a:spAutoFit/>
+          </a:bodyPr>
           <a:lstStyle/>
           <a:p>
-            <a:pPr marL="649492" indent="-649492" defTabSz="537463">
-              <a:spcBef>
-                <a:spcPts val="2500"/>
-              </a:spcBef>
-              <a:buClrTx/>
-              <a:buSzPct val="40000"/>
-              <a:buFontTx/>
-              <a:buBlip>
-                <a:blip r:embed="rId2"/>
-              </a:buBlip>
-              <a:defRPr sz="5888"/>
+            <a:pPr>
+              <a:defRPr sz="4800">
+                <a:latin typeface="Anonymous Pro for Powerline"/>
+                <a:ea typeface="Anonymous Pro for Powerline"/>
+                <a:cs typeface="Anonymous Pro for Powerline"/>
+                <a:sym typeface="Anonymous Pro for Powerline"/>
+              </a:defRPr>
             </a:pPr>
             <a:r>
-              <a:t>Repeats a chunk of code</a:t>
-            </a:r>
-          </a:p>
-          <a:p>
-            <a:pPr marL="649492" indent="-649492" defTabSz="537463">
-              <a:lnSpc>
-                <a:spcPct val="200000"/>
-              </a:lnSpc>
-              <a:spcBef>
-                <a:spcPts val="2500"/>
-              </a:spcBef>
-              <a:buClrTx/>
-              <a:buSzPct val="40000"/>
-              <a:buFontTx/>
-              <a:buBlip>
-                <a:blip r:embed="rId2"/>
-              </a:buBlip>
-              <a:defRPr sz="5888"/>
+              <a:t>pets = [“dog”, “cat”, “fish”]</a:t>
+            </a:r>
+          </a:p>
+          <a:p>
+            <a:pPr>
+              <a:defRPr sz="4800">
+                <a:latin typeface="Anonymous Pro for Powerline"/>
+                <a:ea typeface="Anonymous Pro for Powerline"/>
+                <a:cs typeface="Anonymous Pro for Powerline"/>
+                <a:sym typeface="Anonymous Pro for Powerline"/>
+              </a:defRPr>
             </a:pPr>
             <a:r>
-              <a:t>Hands in different item each time</a:t>
+              <a:t>for pet in pets:</a:t>
+            </a:r>
+          </a:p>
+          <a:p>
+            <a:pPr>
+              <a:defRPr sz="4800">
+                <a:latin typeface="Anonymous Pro for Powerline"/>
+                <a:ea typeface="Anonymous Pro for Powerline"/>
+                <a:cs typeface="Anonymous Pro for Powerline"/>
+                <a:sym typeface="Anonymous Pro for Powerline"/>
+              </a:defRPr>
+            </a:pPr>
+            <a:r>
+              <a:t>    </a:t>
+            </a:r>
+            <a:r>
+              <a:rPr>
+                <a:solidFill>
+                  <a:schemeClr val="accent3"/>
+                </a:solidFill>
+              </a:rPr>
+              <a:t>if pet == “dog”:</a:t>
+            </a:r>
+          </a:p>
+          <a:p>
+            <a:pPr>
+              <a:defRPr sz="4800">
+                <a:latin typeface="Anonymous Pro for Powerline"/>
+                <a:ea typeface="Anonymous Pro for Powerline"/>
+                <a:cs typeface="Anonymous Pro for Powerline"/>
+                <a:sym typeface="Anonymous Pro for Powerline"/>
+              </a:defRPr>
+            </a:pPr>
+            <a:r>
+              <a:t>        print(“Man’s best friend!”)</a:t>
+            </a:r>
+          </a:p>
+          <a:p>
+            <a:pPr>
+              <a:defRPr sz="4800">
+                <a:latin typeface="Anonymous Pro for Powerline"/>
+                <a:ea typeface="Anonymous Pro for Powerline"/>
+                <a:cs typeface="Anonymous Pro for Powerline"/>
+                <a:sym typeface="Anonymous Pro for Powerline"/>
+              </a:defRPr>
+            </a:pPr>
+            <a:r>
+              <a:t>    </a:t>
+            </a:r>
+            <a:r>
+              <a:rPr>
+                <a:solidFill>
+                  <a:schemeClr val="accent3"/>
+                </a:solidFill>
+              </a:rPr>
+              <a:t>else:</a:t>
+            </a:r>
+          </a:p>
+          <a:p>
+            <a:pPr>
+              <a:defRPr sz="4800">
+                <a:latin typeface="Anonymous Pro for Powerline"/>
+                <a:ea typeface="Anonymous Pro for Powerline"/>
+                <a:cs typeface="Anonymous Pro for Powerline"/>
+                <a:sym typeface="Anonymous Pro for Powerline"/>
+              </a:defRPr>
+            </a:pPr>
+            <a:r>
+              <a:t>        print(“whatever”)</a:t>
             </a:r>
           </a:p>
         </p:txBody>
@@ -11664,8 +11699,43 @@
         </p:nvSpPr>
         <p:spPr>
           <a:xfrm>
-            <a:off x="2802102" y="4038600"/>
-            <a:ext cx="7400596" cy="4521200"/>
+            <a:off x="406400" y="1536700"/>
+            <a:ext cx="12192000" cy="1169260"/>
+          </a:xfrm>
+          <a:prstGeom prst="rect">
+            <a:avLst/>
+          </a:prstGeom>
+        </p:spPr>
+        <p:txBody>
+          <a:bodyPr/>
+          <a:lstStyle>
+            <a:lvl1pPr defTabSz="403097">
+              <a:spcBef>
+                <a:spcPts val="1900"/>
+              </a:spcBef>
+              <a:defRPr sz="8280"/>
+            </a:lvl1pPr>
+          </a:lstStyle>
+          <a:p>
+            <a:pPr/>
+            <a:r>
+              <a:t>Range function</a:t>
+            </a:r>
+          </a:p>
+        </p:txBody>
+      </p:sp>
+      <p:sp>
+        <p:nvSpPr>
+          <p:cNvPr id="351" name="Shape 351"/>
+          <p:cNvSpPr/>
+          <p:nvPr>
+            <p:ph type="body" sz="half" idx="1"/>
+          </p:nvPr>
+        </p:nvSpPr>
+        <p:spPr>
+          <a:xfrm>
+            <a:off x="406400" y="3953767"/>
+            <a:ext cx="12192000" cy="2531601"/>
           </a:xfrm>
           <a:prstGeom prst="rect">
             <a:avLst/>
@@ -11675,9 +11745,40 @@
           <a:bodyPr/>
           <a:lstStyle/>
           <a:p>
-            <a:pPr/>
-            <a:r>
-              <a:t>Exercises</a:t>
+            <a:pPr marL="663612" indent="-663612" defTabSz="549148">
+              <a:spcBef>
+                <a:spcPts val="2600"/>
+              </a:spcBef>
+              <a:buClrTx/>
+              <a:buSzPct val="40000"/>
+              <a:buFontTx/>
+              <a:buBlip>
+                <a:blip r:embed="rId2"/>
+              </a:buBlip>
+              <a:defRPr sz="6016"/>
+            </a:pPr>
+            <a:r>
+              <a:t>Generates range of numbers</a:t>
+            </a:r>
+          </a:p>
+          <a:p>
+            <a:pPr marL="663612" indent="-663612" defTabSz="549148">
+              <a:lnSpc>
+                <a:spcPct val="200000"/>
+              </a:lnSpc>
+              <a:spcBef>
+                <a:spcPts val="2600"/>
+              </a:spcBef>
+              <a:buClrTx/>
+              <a:buSzPct val="40000"/>
+              <a:buFontTx/>
+              <a:buBlip>
+                <a:blip r:embed="rId2"/>
+              </a:buBlip>
+              <a:defRPr sz="6016"/>
+            </a:pPr>
+            <a:r>
+              <a:t>Parameters match slice syntax</a:t>
             </a:r>
           </a:p>
         </p:txBody>
@@ -11710,7 +11811,7 @@
       </p:grpSpPr>
       <p:sp>
         <p:nvSpPr>
-          <p:cNvPr id="352" name="Shape 352"/>
+          <p:cNvPr id="353" name="Shape 353"/>
           <p:cNvSpPr/>
           <p:nvPr>
             <p:ph type="title"/>
@@ -11719,7 +11820,7 @@
         <p:spPr>
           <a:xfrm>
             <a:off x="406400" y="1536700"/>
-            <a:ext cx="12192000" cy="999530"/>
+            <a:ext cx="12192000" cy="1169260"/>
           </a:xfrm>
           <a:prstGeom prst="rect">
             <a:avLst/>
@@ -11728,52 +11829,62 @@
         <p:txBody>
           <a:bodyPr/>
           <a:lstStyle>
-            <a:lvl1pPr>
-              <a:defRPr sz="7000"/>
+            <a:lvl1pPr defTabSz="403097">
+              <a:spcBef>
+                <a:spcPts val="1900"/>
+              </a:spcBef>
+              <a:defRPr sz="8280"/>
             </a:lvl1pPr>
           </a:lstStyle>
           <a:p>
             <a:pPr/>
             <a:r>
-              <a:t>Values: what kinds are there?</a:t>
-            </a:r>
-          </a:p>
-        </p:txBody>
-      </p:sp>
-      <p:sp>
-        <p:nvSpPr>
-          <p:cNvPr id="353" name="Shape 353"/>
-          <p:cNvSpPr/>
-          <p:nvPr>
-            <p:ph type="body" sz="half" idx="1"/>
-          </p:nvPr>
-        </p:nvSpPr>
-        <p:spPr>
-          <a:xfrm>
-            <a:off x="579966" y="3930406"/>
-            <a:ext cx="11493038" cy="2716876"/>
-          </a:xfrm>
-          <a:prstGeom prst="rect">
-            <a:avLst/>
-          </a:prstGeom>
-        </p:spPr>
-        <p:txBody>
-          <a:bodyPr/>
-          <a:lstStyle/>
-          <a:p>
-            <a:pPr>
-              <a:defRPr sz="5400"/>
-            </a:pPr>
-            <a:r>
-              <a:t>data types: int, float, string, bool</a:t>
-            </a:r>
-          </a:p>
-          <a:p>
-            <a:pPr>
-              <a:defRPr sz="5400"/>
-            </a:pPr>
-            <a:r>
-              <a:t>lists of the above</a:t>
+              <a:t>Range function</a:t>
+            </a:r>
+          </a:p>
+        </p:txBody>
+      </p:sp>
+      <p:sp>
+        <p:nvSpPr>
+          <p:cNvPr id="354" name="Shape 354"/>
+          <p:cNvSpPr/>
+          <p:nvPr/>
+        </p:nvSpPr>
+        <p:spPr>
+          <a:xfrm>
+            <a:off x="2758543" y="4337049"/>
+            <a:ext cx="6557261" cy="1079501"/>
+          </a:xfrm>
+          <a:prstGeom prst="rect">
+            <a:avLst/>
+          </a:prstGeom>
+          <a:ln w="12700">
+            <a:miter lim="400000"/>
+          </a:ln>
+          <a:extLst>
+            <a:ext uri="{C572A759-6A51-4108-AA02-DFA0A04FC94B}">
+              <ma14:wrappingTextBoxFlag xmlns:ma14="http://schemas.microsoft.com/office/mac/drawingml/2011/main" val="1"/>
+            </a:ext>
+          </a:extLst>
+        </p:spPr>
+        <p:txBody>
+          <a:bodyPr lIns="50800" tIns="50800" rIns="50800" bIns="50800" anchor="ctr">
+            <a:spAutoFit/>
+          </a:bodyPr>
+          <a:lstStyle>
+            <a:lvl1pPr>
+              <a:defRPr sz="6400">
+                <a:latin typeface="Anonymous Pro for Powerline"/>
+                <a:ea typeface="Anonymous Pro for Powerline"/>
+                <a:cs typeface="Anonymous Pro for Powerline"/>
+                <a:sym typeface="Anonymous Pro for Powerline"/>
+              </a:defRPr>
+            </a:lvl1pPr>
+          </a:lstStyle>
+          <a:p>
+            <a:pPr/>
+            <a:r>
+              <a:t>range(3)</a:t>
             </a:r>
           </a:p>
         </p:txBody>
@@ -11806,7 +11917,7 @@
       </p:grpSpPr>
       <p:sp>
         <p:nvSpPr>
-          <p:cNvPr id="355" name="Shape 355"/>
+          <p:cNvPr id="356" name="Shape 356"/>
           <p:cNvSpPr/>
           <p:nvPr>
             <p:ph type="title"/>
@@ -11834,67 +11945,21 @@
           <a:p>
             <a:pPr/>
             <a:r>
-              <a:t>Trouble with Lists</a:t>
-            </a:r>
-          </a:p>
-        </p:txBody>
-      </p:sp>
-      <p:sp>
-        <p:nvSpPr>
-          <p:cNvPr id="356" name="Shape 356"/>
-          <p:cNvSpPr/>
-          <p:nvPr>
-            <p:ph type="body" sz="quarter" idx="1"/>
-          </p:nvPr>
-        </p:nvSpPr>
-        <p:spPr>
-          <a:xfrm>
-            <a:off x="1168400" y="8010796"/>
-            <a:ext cx="12192000" cy="1367169"/>
-          </a:xfrm>
-          <a:prstGeom prst="rect">
-            <a:avLst/>
-          </a:prstGeom>
-        </p:spPr>
-        <p:txBody>
-          <a:bodyPr/>
-          <a:lstStyle>
-            <a:lvl1pPr marL="0" indent="0">
-              <a:buClrTx/>
-              <a:buSzTx/>
-              <a:buFontTx/>
-              <a:buNone/>
-              <a:defRPr sz="6400"/>
-            </a:lvl1pPr>
-          </a:lstStyle>
-          <a:p>
-            <a:pPr/>
-            <a:r>
-              <a:t>Hard to manage lots of data</a:t>
-            </a:r>
-          </a:p>
-        </p:txBody>
-      </p:sp>
-      <p:pic>
-        <p:nvPicPr>
-          <p:cNvPr id="357" name="tribbles.jpg"/>
-          <p:cNvPicPr>
-            <a:picLocks noChangeAspect="1"/>
-          </p:cNvPicPr>
+              <a:t>Range function</a:t>
+            </a:r>
+          </a:p>
+        </p:txBody>
+      </p:sp>
+      <p:sp>
+        <p:nvSpPr>
+          <p:cNvPr id="357" name="Shape 357"/>
+          <p:cNvSpPr/>
           <p:nvPr/>
-        </p:nvPicPr>
-        <p:blipFill>
-          <a:blip r:embed="rId2">
-            <a:extLst/>
-          </a:blip>
-          <a:stretch>
-            <a:fillRect/>
-          </a:stretch>
-        </p:blipFill>
-        <p:spPr>
-          <a:xfrm>
-            <a:off x="1920875" y="2838539"/>
-            <a:ext cx="9163050" cy="5039678"/>
+        </p:nvSpPr>
+        <p:spPr>
+          <a:xfrm>
+            <a:off x="2758543" y="4337049"/>
+            <a:ext cx="6557261" cy="1079501"/>
           </a:xfrm>
           <a:prstGeom prst="rect">
             <a:avLst/>
@@ -11902,8 +11967,126 @@
           <a:ln w="12700">
             <a:miter lim="400000"/>
           </a:ln>
-        </p:spPr>
-      </p:pic>
+          <a:extLst>
+            <a:ext uri="{C572A759-6A51-4108-AA02-DFA0A04FC94B}">
+              <ma14:wrappingTextBoxFlag xmlns:ma14="http://schemas.microsoft.com/office/mac/drawingml/2011/main" val="1"/>
+            </a:ext>
+          </a:extLst>
+        </p:spPr>
+        <p:txBody>
+          <a:bodyPr lIns="50800" tIns="50800" rIns="50800" bIns="50800" anchor="ctr">
+            <a:spAutoFit/>
+          </a:bodyPr>
+          <a:lstStyle>
+            <a:lvl1pPr>
+              <a:defRPr sz="6400">
+                <a:latin typeface="Anonymous Pro for Powerline"/>
+                <a:ea typeface="Anonymous Pro for Powerline"/>
+                <a:cs typeface="Anonymous Pro for Powerline"/>
+                <a:sym typeface="Anonymous Pro for Powerline"/>
+              </a:defRPr>
+            </a:lvl1pPr>
+          </a:lstStyle>
+          <a:p>
+            <a:pPr/>
+            <a:r>
+              <a:t>range(3)</a:t>
+            </a:r>
+          </a:p>
+        </p:txBody>
+      </p:sp>
+      <p:sp>
+        <p:nvSpPr>
+          <p:cNvPr id="358" name="Shape 358"/>
+          <p:cNvSpPr/>
+          <p:nvPr/>
+        </p:nvSpPr>
+        <p:spPr>
+          <a:xfrm rot="21591301">
+            <a:off x="2940979" y="6011983"/>
+            <a:ext cx="1620784" cy="518252"/>
+          </a:xfrm>
+          <a:prstGeom prst="rightArrow">
+            <a:avLst>
+              <a:gd name="adj1" fmla="val 34174"/>
+              <a:gd name="adj2" fmla="val 145948"/>
+            </a:avLst>
+          </a:prstGeom>
+          <a:solidFill>
+            <a:schemeClr val="accent5"/>
+          </a:solidFill>
+          <a:ln w="12700">
+            <a:miter lim="400000"/>
+          </a:ln>
+        </p:spPr>
+        <p:txBody>
+          <a:bodyPr lIns="50800" tIns="50800" rIns="50800" bIns="50800" anchor="ctr"/>
+          <a:lstStyle/>
+          <a:p>
+            <a:pPr algn="ctr">
+              <a:lnSpc>
+                <a:spcPct val="80000"/>
+              </a:lnSpc>
+              <a:spcBef>
+                <a:spcPts val="0"/>
+              </a:spcBef>
+              <a:defRPr cap="all" sz="2800">
+                <a:solidFill>
+                  <a:srgbClr val="FFFFFF"/>
+                </a:solidFill>
+                <a:latin typeface="+mn-lt"/>
+                <a:ea typeface="+mn-ea"/>
+                <a:cs typeface="+mn-cs"/>
+                <a:sym typeface="DIN Condensed"/>
+              </a:defRPr>
+            </a:pPr>
+          </a:p>
+        </p:txBody>
+      </p:sp>
+      <p:sp>
+        <p:nvSpPr>
+          <p:cNvPr id="359" name="Shape 359"/>
+          <p:cNvSpPr/>
+          <p:nvPr/>
+        </p:nvSpPr>
+        <p:spPr>
+          <a:xfrm>
+            <a:off x="4761271" y="5699472"/>
+            <a:ext cx="2205991" cy="1143001"/>
+          </a:xfrm>
+          <a:prstGeom prst="rect">
+            <a:avLst/>
+          </a:prstGeom>
+          <a:ln w="12700">
+            <a:miter lim="400000"/>
+          </a:ln>
+          <a:extLst>
+            <a:ext uri="{C572A759-6A51-4108-AA02-DFA0A04FC94B}">
+              <ma14:wrappingTextBoxFlag xmlns:ma14="http://schemas.microsoft.com/office/mac/drawingml/2011/main" val="1"/>
+            </a:ext>
+          </a:extLst>
+        </p:spPr>
+        <p:txBody>
+          <a:bodyPr wrap="none" lIns="50800" tIns="50800" rIns="50800" bIns="50800" anchor="ctr">
+            <a:spAutoFit/>
+          </a:bodyPr>
+          <a:lstStyle>
+            <a:lvl1pPr>
+              <a:defRPr sz="6000">
+                <a:solidFill>
+                  <a:schemeClr val="accent5"/>
+                </a:solidFill>
+              </a:defRPr>
+            </a:lvl1pPr>
+          </a:lstStyle>
+          <a:p>
+            <a:pPr/>
+            <a:r>
+              <a:t>0, 1, 2</a:t>
+            </a:r>
+          </a:p>
+        </p:txBody>
+      </p:sp>
     </p:spTree>
   </p:cSld>
   <p:clrMapOvr>
@@ -11932,7 +12115,7 @@
       </p:grpSpPr>
       <p:sp>
         <p:nvSpPr>
-          <p:cNvPr id="359" name="Shape 359"/>
+          <p:cNvPr id="361" name="Shape 361"/>
           <p:cNvSpPr/>
           <p:nvPr>
             <p:ph type="title"/>
@@ -11960,100 +12143,25 @@
           <a:p>
             <a:pPr/>
             <a:r>
-              <a:t>Trouble with Lists</a:t>
-            </a:r>
-          </a:p>
-        </p:txBody>
-      </p:sp>
-      <p:sp>
-        <p:nvSpPr>
-          <p:cNvPr id="360" name="Shape 360"/>
-          <p:cNvSpPr/>
-          <p:nvPr>
-            <p:ph type="body" sz="quarter" idx="1"/>
-          </p:nvPr>
-        </p:nvSpPr>
-        <p:spPr>
-          <a:xfrm>
-            <a:off x="1168400" y="8010796"/>
-            <a:ext cx="12192000" cy="1367169"/>
-          </a:xfrm>
-          <a:prstGeom prst="rect">
-            <a:avLst/>
-          </a:prstGeom>
-        </p:spPr>
-        <p:txBody>
-          <a:bodyPr/>
-          <a:lstStyle>
-            <a:lvl1pPr marL="0" indent="0">
-              <a:buClrTx/>
-              <a:buSzTx/>
-              <a:buFontTx/>
-              <a:buNone/>
-              <a:defRPr sz="6400"/>
-            </a:lvl1pPr>
-          </a:lstStyle>
-          <a:p>
-            <a:pPr/>
-            <a:r>
-              <a:t>Hard to manage lots of data</a:t>
-            </a:r>
-          </a:p>
-        </p:txBody>
-      </p:sp>
-      <p:pic>
-        <p:nvPicPr>
-          <p:cNvPr id="361" name="tribbles.jpg"/>
-          <p:cNvPicPr>
-            <a:picLocks noChangeAspect="1"/>
-          </p:cNvPicPr>
+              <a:t>Range function</a:t>
+            </a:r>
+          </a:p>
+        </p:txBody>
+      </p:sp>
+      <p:sp>
+        <p:nvSpPr>
+          <p:cNvPr id="362" name="Shape 362"/>
+          <p:cNvSpPr/>
           <p:nvPr/>
-        </p:nvPicPr>
-        <p:blipFill>
-          <a:blip r:embed="rId2">
-            <a:extLst/>
-          </a:blip>
-          <a:stretch>
-            <a:fillRect/>
-          </a:stretch>
-        </p:blipFill>
-        <p:spPr>
-          <a:xfrm>
-            <a:off x="1920875" y="2838539"/>
-            <a:ext cx="9163050" cy="5039678"/>
-          </a:xfrm>
-          <a:prstGeom prst="rect">
-            <a:avLst/>
-          </a:prstGeom>
-          <a:ln w="12700">
-            <a:miter lim="400000"/>
-          </a:ln>
-        </p:spPr>
-      </p:pic>
-      <p:sp>
-        <p:nvSpPr>
-          <p:cNvPr id="362" name="Shape 362"/>
-          <p:cNvSpPr/>
-          <p:nvPr/>
-        </p:nvSpPr>
-        <p:spPr>
-          <a:xfrm>
-            <a:off x="7641166" y="1101814"/>
-            <a:ext cx="3297504" cy="2464859"/>
-          </a:xfrm>
-          <a:prstGeom prst="wedgeEllipseCallout">
-            <a:avLst>
-              <a:gd name="adj1" fmla="val -49385"/>
-              <a:gd name="adj2" fmla="val 63172"/>
-            </a:avLst>
-          </a:prstGeom>
-          <a:solidFill>
-            <a:schemeClr val="accent5">
-              <a:hueOff val="-180946"/>
-              <a:satOff val="-2351"/>
-              <a:lumOff val="-8716"/>
-            </a:schemeClr>
-          </a:solidFill>
+        </p:nvSpPr>
+        <p:spPr>
+          <a:xfrm>
+            <a:off x="2758543" y="4337049"/>
+            <a:ext cx="6557261" cy="1079501"/>
+          </a:xfrm>
+          <a:prstGeom prst="rect">
+            <a:avLst/>
+          </a:prstGeom>
           <a:ln w="12700">
             <a:miter lim="400000"/>
           </a:ln>
@@ -12064,30 +12172,23 @@
           </a:extLst>
         </p:spPr>
         <p:txBody>
-          <a:bodyPr lIns="50800" tIns="50800" rIns="50800" bIns="50800" anchor="ctr"/>
+          <a:bodyPr lIns="50800" tIns="50800" rIns="50800" bIns="50800" anchor="ctr">
+            <a:spAutoFit/>
+          </a:bodyPr>
           <a:lstStyle>
-            <a:lvl1pPr algn="ctr">
-              <a:lnSpc>
-                <a:spcPct val="80000"/>
-              </a:lnSpc>
-              <a:spcBef>
-                <a:spcPts val="0"/>
-              </a:spcBef>
-              <a:defRPr cap="all" sz="3800">
-                <a:solidFill>
-                  <a:srgbClr val="FFFFFF"/>
-                </a:solidFill>
-                <a:latin typeface="+mn-lt"/>
-                <a:ea typeface="+mn-ea"/>
-                <a:cs typeface="+mn-cs"/>
-                <a:sym typeface="DIN Condensed"/>
+            <a:lvl1pPr>
+              <a:defRPr sz="6400">
+                <a:latin typeface="Anonymous Pro for Powerline"/>
+                <a:ea typeface="Anonymous Pro for Powerline"/>
+                <a:cs typeface="Anonymous Pro for Powerline"/>
+                <a:sym typeface="Anonymous Pro for Powerline"/>
               </a:defRPr>
             </a:lvl1pPr>
           </a:lstStyle>
           <a:p>
             <a:pPr/>
             <a:r>
-              <a:t>Was it my_list[8] or my_list[9]?</a:t>
+              <a:t>range(1,4)</a:t>
             </a:r>
           </a:p>
         </p:txBody>
@@ -12118,35 +12219,178 @@
           <a:chExt cx="0" cy="0"/>
         </a:xfrm>
       </p:grpSpPr>
-      <p:pic>
-        <p:nvPicPr>
-          <p:cNvPr id="364" name="newchallenger.png"/>
-          <p:cNvPicPr>
-            <a:picLocks noChangeAspect="1"/>
-          </p:cNvPicPr>
+      <p:sp>
+        <p:nvSpPr>
+          <p:cNvPr id="364" name="Shape 364"/>
+          <p:cNvSpPr/>
           <p:nvPr>
-            <p:ph type="pic" idx="13"/>
+            <p:ph type="title"/>
           </p:nvPr>
-        </p:nvPicPr>
-        <p:blipFill>
-          <a:blip r:embed="rId2">
-            <a:extLst/>
-          </a:blip>
-          <a:srcRect l="0" t="0" r="0" b="0"/>
-          <a:stretch>
-            <a:fillRect/>
-          </a:stretch>
-        </p:blipFill>
-        <p:spPr>
-          <a:xfrm>
-            <a:off x="0" y="2255360"/>
-            <a:ext cx="13004800" cy="5242880"/>
-          </a:xfrm>
-          <a:prstGeom prst="rect">
-            <a:avLst/>
-          </a:prstGeom>
-        </p:spPr>
-      </p:pic>
+        </p:nvSpPr>
+        <p:spPr>
+          <a:xfrm>
+            <a:off x="406400" y="1536700"/>
+            <a:ext cx="12192000" cy="1169260"/>
+          </a:xfrm>
+          <a:prstGeom prst="rect">
+            <a:avLst/>
+          </a:prstGeom>
+        </p:spPr>
+        <p:txBody>
+          <a:bodyPr/>
+          <a:lstStyle>
+            <a:lvl1pPr defTabSz="403097">
+              <a:spcBef>
+                <a:spcPts val="1900"/>
+              </a:spcBef>
+              <a:defRPr sz="8280"/>
+            </a:lvl1pPr>
+          </a:lstStyle>
+          <a:p>
+            <a:pPr/>
+            <a:r>
+              <a:t>Range function</a:t>
+            </a:r>
+          </a:p>
+        </p:txBody>
+      </p:sp>
+      <p:sp>
+        <p:nvSpPr>
+          <p:cNvPr id="365" name="Shape 365"/>
+          <p:cNvSpPr/>
+          <p:nvPr/>
+        </p:nvSpPr>
+        <p:spPr>
+          <a:xfrm>
+            <a:off x="2758543" y="4337049"/>
+            <a:ext cx="6557261" cy="1079501"/>
+          </a:xfrm>
+          <a:prstGeom prst="rect">
+            <a:avLst/>
+          </a:prstGeom>
+          <a:ln w="12700">
+            <a:miter lim="400000"/>
+          </a:ln>
+          <a:extLst>
+            <a:ext uri="{C572A759-6A51-4108-AA02-DFA0A04FC94B}">
+              <ma14:wrappingTextBoxFlag xmlns:ma14="http://schemas.microsoft.com/office/mac/drawingml/2011/main" val="1"/>
+            </a:ext>
+          </a:extLst>
+        </p:spPr>
+        <p:txBody>
+          <a:bodyPr lIns="50800" tIns="50800" rIns="50800" bIns="50800" anchor="ctr">
+            <a:spAutoFit/>
+          </a:bodyPr>
+          <a:lstStyle>
+            <a:lvl1pPr>
+              <a:defRPr sz="6400">
+                <a:latin typeface="Anonymous Pro for Powerline"/>
+                <a:ea typeface="Anonymous Pro for Powerline"/>
+                <a:cs typeface="Anonymous Pro for Powerline"/>
+                <a:sym typeface="Anonymous Pro for Powerline"/>
+              </a:defRPr>
+            </a:lvl1pPr>
+          </a:lstStyle>
+          <a:p>
+            <a:pPr/>
+            <a:r>
+              <a:t>range(1,4)</a:t>
+            </a:r>
+          </a:p>
+        </p:txBody>
+      </p:sp>
+      <p:sp>
+        <p:nvSpPr>
+          <p:cNvPr id="366" name="Shape 366"/>
+          <p:cNvSpPr/>
+          <p:nvPr/>
+        </p:nvSpPr>
+        <p:spPr>
+          <a:xfrm rot="21591301">
+            <a:off x="2940979" y="6011983"/>
+            <a:ext cx="1620784" cy="518252"/>
+          </a:xfrm>
+          <a:prstGeom prst="rightArrow">
+            <a:avLst>
+              <a:gd name="adj1" fmla="val 34174"/>
+              <a:gd name="adj2" fmla="val 145948"/>
+            </a:avLst>
+          </a:prstGeom>
+          <a:solidFill>
+            <a:schemeClr val="accent5"/>
+          </a:solidFill>
+          <a:ln w="12700">
+            <a:miter lim="400000"/>
+          </a:ln>
+        </p:spPr>
+        <p:txBody>
+          <a:bodyPr lIns="50800" tIns="50800" rIns="50800" bIns="50800" anchor="ctr"/>
+          <a:lstStyle/>
+          <a:p>
+            <a:pPr algn="ctr">
+              <a:lnSpc>
+                <a:spcPct val="80000"/>
+              </a:lnSpc>
+              <a:spcBef>
+                <a:spcPts val="0"/>
+              </a:spcBef>
+              <a:defRPr cap="all" sz="2800">
+                <a:solidFill>
+                  <a:srgbClr val="FFFFFF"/>
+                </a:solidFill>
+                <a:latin typeface="+mn-lt"/>
+                <a:ea typeface="+mn-ea"/>
+                <a:cs typeface="+mn-cs"/>
+                <a:sym typeface="DIN Condensed"/>
+              </a:defRPr>
+            </a:pPr>
+          </a:p>
+        </p:txBody>
+      </p:sp>
+      <p:sp>
+        <p:nvSpPr>
+          <p:cNvPr id="367" name="Shape 367"/>
+          <p:cNvSpPr/>
+          <p:nvPr/>
+        </p:nvSpPr>
+        <p:spPr>
+          <a:xfrm>
+            <a:off x="4761271" y="5699472"/>
+            <a:ext cx="2205991" cy="1143001"/>
+          </a:xfrm>
+          <a:prstGeom prst="rect">
+            <a:avLst/>
+          </a:prstGeom>
+          <a:ln w="12700">
+            <a:miter lim="400000"/>
+          </a:ln>
+          <a:extLst>
+            <a:ext uri="{C572A759-6A51-4108-AA02-DFA0A04FC94B}">
+              <ma14:wrappingTextBoxFlag xmlns:ma14="http://schemas.microsoft.com/office/mac/drawingml/2011/main" val="1"/>
+            </a:ext>
+          </a:extLst>
+        </p:spPr>
+        <p:txBody>
+          <a:bodyPr wrap="none" lIns="50800" tIns="50800" rIns="50800" bIns="50800" anchor="ctr">
+            <a:spAutoFit/>
+          </a:bodyPr>
+          <a:lstStyle>
+            <a:lvl1pPr>
+              <a:defRPr sz="6000">
+                <a:solidFill>
+                  <a:schemeClr val="accent5"/>
+                </a:solidFill>
+              </a:defRPr>
+            </a:lvl1pPr>
+          </a:lstStyle>
+          <a:p>
+            <a:pPr/>
+            <a:r>
+              <a:t>1, 2, 3</a:t>
+            </a:r>
+          </a:p>
+        </p:txBody>
+      </p:sp>
     </p:spTree>
   </p:cSld>
   <p:clrMapOvr>
@@ -12175,7 +12419,7 @@
       </p:grpSpPr>
       <p:sp>
         <p:nvSpPr>
-          <p:cNvPr id="366" name="Shape 366"/>
+          <p:cNvPr id="369" name="Shape 369"/>
           <p:cNvSpPr/>
           <p:nvPr>
             <p:ph type="title"/>
@@ -12203,66 +12447,144 @@
           <a:p>
             <a:pPr/>
             <a:r>
-              <a:t>Dictionary</a:t>
-            </a:r>
-          </a:p>
-        </p:txBody>
-      </p:sp>
-      <p:sp>
-        <p:nvSpPr>
-          <p:cNvPr id="367" name="Shape 367"/>
-          <p:cNvSpPr/>
-          <p:nvPr>
-            <p:ph type="body" sz="half" idx="1"/>
-          </p:nvPr>
-        </p:nvSpPr>
-        <p:spPr>
-          <a:xfrm>
-            <a:off x="406400" y="3953767"/>
-            <a:ext cx="12192000" cy="2531601"/>
-          </a:xfrm>
-          <a:prstGeom prst="rect">
-            <a:avLst/>
-          </a:prstGeom>
-        </p:spPr>
-        <p:txBody>
-          <a:bodyPr/>
+              <a:t>Range function</a:t>
+            </a:r>
+          </a:p>
+        </p:txBody>
+      </p:sp>
+      <p:sp>
+        <p:nvSpPr>
+          <p:cNvPr id="370" name="Shape 370"/>
+          <p:cNvSpPr/>
+          <p:nvPr/>
+        </p:nvSpPr>
+        <p:spPr>
+          <a:xfrm>
+            <a:off x="2758543" y="4337049"/>
+            <a:ext cx="6557261" cy="1079501"/>
+          </a:xfrm>
+          <a:prstGeom prst="rect">
+            <a:avLst/>
+          </a:prstGeom>
+          <a:ln w="12700">
+            <a:miter lim="400000"/>
+          </a:ln>
+          <a:extLst>
+            <a:ext uri="{C572A759-6A51-4108-AA02-DFA0A04FC94B}">
+              <ma14:wrappingTextBoxFlag xmlns:ma14="http://schemas.microsoft.com/office/mac/drawingml/2011/main" val="1"/>
+            </a:ext>
+          </a:extLst>
+        </p:spPr>
+        <p:txBody>
+          <a:bodyPr lIns="50800" tIns="50800" rIns="50800" bIns="50800" anchor="ctr">
+            <a:spAutoFit/>
+          </a:bodyPr>
+          <a:lstStyle>
+            <a:lvl1pPr>
+              <a:defRPr sz="6400">
+                <a:latin typeface="Anonymous Pro for Powerline"/>
+                <a:ea typeface="Anonymous Pro for Powerline"/>
+                <a:cs typeface="Anonymous Pro for Powerline"/>
+                <a:sym typeface="Anonymous Pro for Powerline"/>
+              </a:defRPr>
+            </a:lvl1pPr>
+          </a:lstStyle>
+          <a:p>
+            <a:pPr/>
+            <a:r>
+              <a:t>range(3,0,-1)</a:t>
+            </a:r>
+          </a:p>
+        </p:txBody>
+      </p:sp>
+      <p:sp>
+        <p:nvSpPr>
+          <p:cNvPr id="371" name="Shape 371"/>
+          <p:cNvSpPr/>
+          <p:nvPr/>
+        </p:nvSpPr>
+        <p:spPr>
+          <a:xfrm rot="21591301">
+            <a:off x="2940979" y="6011983"/>
+            <a:ext cx="1620784" cy="518252"/>
+          </a:xfrm>
+          <a:prstGeom prst="rightArrow">
+            <a:avLst>
+              <a:gd name="adj1" fmla="val 34174"/>
+              <a:gd name="adj2" fmla="val 145948"/>
+            </a:avLst>
+          </a:prstGeom>
+          <a:solidFill>
+            <a:schemeClr val="accent5"/>
+          </a:solidFill>
+          <a:ln w="12700">
+            <a:miter lim="400000"/>
+          </a:ln>
+        </p:spPr>
+        <p:txBody>
+          <a:bodyPr lIns="50800" tIns="50800" rIns="50800" bIns="50800" anchor="ctr"/>
           <a:lstStyle/>
           <a:p>
-            <a:pPr marL="621254" indent="-621254" defTabSz="514095">
-              <a:spcBef>
-                <a:spcPts val="2400"/>
-              </a:spcBef>
-              <a:buClrTx/>
-              <a:buSzPct val="40000"/>
-              <a:buFontTx/>
-              <a:buBlip>
-                <a:blip r:embed="rId2"/>
-              </a:buBlip>
-              <a:defRPr sz="5632"/>
-            </a:pPr>
-            <a:r>
-              <a:t>Store a value under a name (“key”)</a:t>
-            </a:r>
-          </a:p>
-          <a:p>
-            <a:pPr marL="621254" indent="-621254" defTabSz="514095">
+            <a:pPr algn="ctr">
               <a:lnSpc>
-                <a:spcPct val="200000"/>
+                <a:spcPct val="80000"/>
               </a:lnSpc>
               <a:spcBef>
-                <a:spcPts val="2400"/>
+                <a:spcPts val="0"/>
               </a:spcBef>
-              <a:buClrTx/>
-              <a:buSzPct val="40000"/>
-              <a:buFontTx/>
-              <a:buBlip>
-                <a:blip r:embed="rId2"/>
-              </a:buBlip>
-              <a:defRPr sz="5632"/>
+              <a:defRPr cap="all" sz="2800">
+                <a:solidFill>
+                  <a:srgbClr val="FFFFFF"/>
+                </a:solidFill>
+                <a:latin typeface="+mn-lt"/>
+                <a:ea typeface="+mn-ea"/>
+                <a:cs typeface="+mn-cs"/>
+                <a:sym typeface="DIN Condensed"/>
+              </a:defRPr>
             </a:pPr>
-            <a:r>
-              <a:t>Fetch value later by key</a:t>
+          </a:p>
+        </p:txBody>
+      </p:sp>
+      <p:sp>
+        <p:nvSpPr>
+          <p:cNvPr id="372" name="Shape 372"/>
+          <p:cNvSpPr/>
+          <p:nvPr/>
+        </p:nvSpPr>
+        <p:spPr>
+          <a:xfrm>
+            <a:off x="4761271" y="5699472"/>
+            <a:ext cx="2205991" cy="1143001"/>
+          </a:xfrm>
+          <a:prstGeom prst="rect">
+            <a:avLst/>
+          </a:prstGeom>
+          <a:ln w="12700">
+            <a:miter lim="400000"/>
+          </a:ln>
+          <a:extLst>
+            <a:ext uri="{C572A759-6A51-4108-AA02-DFA0A04FC94B}">
+              <ma14:wrappingTextBoxFlag xmlns:ma14="http://schemas.microsoft.com/office/mac/drawingml/2011/main" val="1"/>
+            </a:ext>
+          </a:extLst>
+        </p:spPr>
+        <p:txBody>
+          <a:bodyPr wrap="none" lIns="50800" tIns="50800" rIns="50800" bIns="50800" anchor="ctr">
+            <a:spAutoFit/>
+          </a:bodyPr>
+          <a:lstStyle>
+            <a:lvl1pPr>
+              <a:defRPr sz="6000">
+                <a:solidFill>
+                  <a:schemeClr val="accent5"/>
+                </a:solidFill>
+              </a:defRPr>
+            </a:lvl1pPr>
+          </a:lstStyle>
+          <a:p>
+            <a:pPr/>
+            <a:r>
+              <a:t>3, 2, 1</a:t>
             </a:r>
           </a:p>
         </p:txBody>
@@ -12295,7 +12617,7 @@
       </p:grpSpPr>
       <p:sp>
         <p:nvSpPr>
-          <p:cNvPr id="369" name="Shape 369"/>
+          <p:cNvPr id="374" name="Shape 374"/>
           <p:cNvSpPr/>
           <p:nvPr>
             <p:ph type="title"/>
@@ -12323,63 +12645,57 @@
           <a:p>
             <a:pPr/>
             <a:r>
-              <a:t>Dictionary</a:t>
-            </a:r>
-          </a:p>
-        </p:txBody>
-      </p:sp>
-      <p:sp>
-        <p:nvSpPr>
-          <p:cNvPr id="370" name="Shape 370"/>
-          <p:cNvSpPr/>
-          <p:nvPr/>
-        </p:nvSpPr>
-        <p:spPr>
-          <a:xfrm>
-            <a:off x="697654" y="4334933"/>
-            <a:ext cx="11609491" cy="2057401"/>
-          </a:xfrm>
-          <a:prstGeom prst="rect">
-            <a:avLst/>
-          </a:prstGeom>
-          <a:ln w="12700">
-            <a:miter lim="400000"/>
-          </a:ln>
-          <a:extLst>
-            <a:ext uri="{C572A759-6A51-4108-AA02-DFA0A04FC94B}">
-              <ma14:wrappingTextBoxFlag xmlns:ma14="http://schemas.microsoft.com/office/mac/drawingml/2011/main" val="1"/>
-            </a:ext>
-          </a:extLst>
-        </p:spPr>
-        <p:txBody>
-          <a:bodyPr lIns="50800" tIns="50800" rIns="50800" bIns="50800" anchor="ctr">
-            <a:spAutoFit/>
-          </a:bodyPr>
+              <a:t>Range is Not A List</a:t>
+            </a:r>
+          </a:p>
+        </p:txBody>
+      </p:sp>
+      <p:sp>
+        <p:nvSpPr>
+          <p:cNvPr id="375" name="Shape 375"/>
+          <p:cNvSpPr/>
+          <p:nvPr>
+            <p:ph type="body" idx="1"/>
+          </p:nvPr>
+        </p:nvSpPr>
+        <p:spPr>
+          <a:xfrm>
+            <a:off x="406400" y="3953767"/>
+            <a:ext cx="12192000" cy="4990288"/>
+          </a:xfrm>
+          <a:prstGeom prst="rect">
+            <a:avLst/>
+          </a:prstGeom>
+        </p:spPr>
+        <p:txBody>
+          <a:bodyPr/>
           <a:lstStyle/>
           <a:p>
-            <a:pPr>
-              <a:defRPr sz="5400">
-                <a:latin typeface="Anonymous Pro for Powerline"/>
-                <a:ea typeface="Anonymous Pro for Powerline"/>
-                <a:cs typeface="Anonymous Pro for Powerline"/>
-                <a:sym typeface="Anonymous Pro for Powerline"/>
-              </a:defRPr>
+            <a:pPr marL="705970" indent="-705970">
+              <a:buClrTx/>
+              <a:buSzPct val="40000"/>
+              <a:buFontTx/>
+              <a:buBlip>
+                <a:blip r:embed="rId2"/>
+              </a:buBlip>
+              <a:defRPr sz="6400"/>
             </a:pPr>
             <a:r>
-              <a:t>my_dict = { “name”: “Rob” }</a:t>
-            </a:r>
-          </a:p>
-          <a:p>
-            <a:pPr>
-              <a:defRPr sz="5400">
-                <a:latin typeface="Anonymous Pro for Powerline"/>
-                <a:ea typeface="Anonymous Pro for Powerline"/>
-                <a:cs typeface="Anonymous Pro for Powerline"/>
-                <a:sym typeface="Anonymous Pro for Powerline"/>
-              </a:defRPr>
+              <a:t>Returns a “lazy” list</a:t>
+            </a:r>
+          </a:p>
+          <a:p>
+            <a:pPr marL="705970" indent="-705970">
+              <a:buClrTx/>
+              <a:buSzPct val="40000"/>
+              <a:buFontTx/>
+              <a:buBlip>
+                <a:blip r:embed="rId2"/>
+              </a:buBlip>
+              <a:defRPr sz="6400"/>
             </a:pPr>
             <a:r>
-              <a:t> </a:t>
+              <a:t>Numbers are generated one-by-one to save memory</a:t>
             </a:r>
           </a:p>
         </p:txBody>
@@ -12412,7 +12728,7 @@
       </p:grpSpPr>
       <p:sp>
         <p:nvSpPr>
-          <p:cNvPr id="372" name="Shape 372"/>
+          <p:cNvPr id="377" name="Shape 377"/>
           <p:cNvSpPr/>
           <p:nvPr>
             <p:ph type="title"/>
@@ -12440,21 +12756,21 @@
           <a:p>
             <a:pPr/>
             <a:r>
-              <a:t>Dictionary</a:t>
-            </a:r>
-          </a:p>
-        </p:txBody>
-      </p:sp>
-      <p:sp>
-        <p:nvSpPr>
-          <p:cNvPr id="373" name="Shape 373"/>
+              <a:t>Convert Range to list</a:t>
+            </a:r>
+          </a:p>
+        </p:txBody>
+      </p:sp>
+      <p:sp>
+        <p:nvSpPr>
+          <p:cNvPr id="378" name="Shape 378"/>
           <p:cNvSpPr/>
           <p:nvPr/>
         </p:nvSpPr>
         <p:spPr>
           <a:xfrm>
-            <a:off x="697654" y="4210050"/>
-            <a:ext cx="11609491" cy="3187701"/>
+            <a:off x="2690655" y="4337049"/>
+            <a:ext cx="8718472" cy="1079501"/>
           </a:xfrm>
           <a:prstGeom prst="rect">
             <a:avLst/>
@@ -12472,44 +12788,112 @@
           <a:bodyPr lIns="50800" tIns="50800" rIns="50800" bIns="50800" anchor="ctr">
             <a:spAutoFit/>
           </a:bodyPr>
-          <a:lstStyle/>
-          <a:p>
-            <a:pPr>
-              <a:defRPr sz="5400">
+          <a:lstStyle>
+            <a:lvl1pPr>
+              <a:defRPr sz="6400">
                 <a:latin typeface="Anonymous Pro for Powerline"/>
                 <a:ea typeface="Anonymous Pro for Powerline"/>
                 <a:cs typeface="Anonymous Pro for Powerline"/>
                 <a:sym typeface="Anonymous Pro for Powerline"/>
               </a:defRPr>
+            </a:lvl1pPr>
+          </a:lstStyle>
+          <a:p>
+            <a:pPr/>
+            <a:r>
+              <a:t>list(range(3))</a:t>
+            </a:r>
+          </a:p>
+        </p:txBody>
+      </p:sp>
+      <p:sp>
+        <p:nvSpPr>
+          <p:cNvPr id="379" name="Shape 379"/>
+          <p:cNvSpPr/>
+          <p:nvPr/>
+        </p:nvSpPr>
+        <p:spPr>
+          <a:xfrm rot="21591301">
+            <a:off x="2940979" y="6011983"/>
+            <a:ext cx="1620784" cy="518252"/>
+          </a:xfrm>
+          <a:prstGeom prst="rightArrow">
+            <a:avLst>
+              <a:gd name="adj1" fmla="val 34174"/>
+              <a:gd name="adj2" fmla="val 145948"/>
+            </a:avLst>
+          </a:prstGeom>
+          <a:solidFill>
+            <a:schemeClr val="accent5"/>
+          </a:solidFill>
+          <a:ln w="12700">
+            <a:miter lim="400000"/>
+          </a:ln>
+        </p:spPr>
+        <p:txBody>
+          <a:bodyPr lIns="50800" tIns="50800" rIns="50800" bIns="50800" anchor="ctr"/>
+          <a:lstStyle/>
+          <a:p>
+            <a:pPr algn="ctr">
+              <a:lnSpc>
+                <a:spcPct val="80000"/>
+              </a:lnSpc>
+              <a:spcBef>
+                <a:spcPts val="0"/>
+              </a:spcBef>
+              <a:defRPr cap="all" sz="2800">
+                <a:solidFill>
+                  <a:srgbClr val="FFFFFF"/>
+                </a:solidFill>
+                <a:latin typeface="+mn-lt"/>
+                <a:ea typeface="+mn-ea"/>
+                <a:cs typeface="+mn-cs"/>
+                <a:sym typeface="DIN Condensed"/>
+              </a:defRPr>
             </a:pPr>
-            <a:r>
-              <a:t>my_dict = {“name”: “Rob”, </a:t>
-            </a:r>
-          </a:p>
-          <a:p>
-            <a:pPr>
-              <a:defRPr sz="5400">
-                <a:latin typeface="Anonymous Pro for Powerline"/>
-                <a:ea typeface="Anonymous Pro for Powerline"/>
-                <a:cs typeface="Anonymous Pro for Powerline"/>
-                <a:sym typeface="Anonymous Pro for Powerline"/>
-              </a:defRPr>
-            </a:pPr>
-            <a:r>
-              <a:t>           “hair”: “brown”}</a:t>
-            </a:r>
-          </a:p>
-          <a:p>
-            <a:pPr>
-              <a:defRPr sz="5400">
-                <a:latin typeface="Anonymous Pro for Powerline"/>
-                <a:ea typeface="Anonymous Pro for Powerline"/>
-                <a:cs typeface="Anonymous Pro for Powerline"/>
-                <a:sym typeface="Anonymous Pro for Powerline"/>
-              </a:defRPr>
-            </a:pPr>
-            <a:r>
-              <a:t> </a:t>
+          </a:p>
+        </p:txBody>
+      </p:sp>
+      <p:sp>
+        <p:nvSpPr>
+          <p:cNvPr id="380" name="Shape 380"/>
+          <p:cNvSpPr/>
+          <p:nvPr/>
+        </p:nvSpPr>
+        <p:spPr>
+          <a:xfrm>
+            <a:off x="4761271" y="5699472"/>
+            <a:ext cx="2686051" cy="1143001"/>
+          </a:xfrm>
+          <a:prstGeom prst="rect">
+            <a:avLst/>
+          </a:prstGeom>
+          <a:ln w="12700">
+            <a:miter lim="400000"/>
+          </a:ln>
+          <a:extLst>
+            <a:ext uri="{C572A759-6A51-4108-AA02-DFA0A04FC94B}">
+              <ma14:wrappingTextBoxFlag xmlns:ma14="http://schemas.microsoft.com/office/mac/drawingml/2011/main" val="1"/>
+            </a:ext>
+          </a:extLst>
+        </p:spPr>
+        <p:txBody>
+          <a:bodyPr wrap="none" lIns="50800" tIns="50800" rIns="50800" bIns="50800" anchor="ctr">
+            <a:spAutoFit/>
+          </a:bodyPr>
+          <a:lstStyle>
+            <a:lvl1pPr>
+              <a:defRPr sz="6000">
+                <a:solidFill>
+                  <a:schemeClr val="accent5"/>
+                </a:solidFill>
+              </a:defRPr>
+            </a:lvl1pPr>
+          </a:lstStyle>
+          <a:p>
+            <a:pPr/>
+            <a:r>
+              <a:t>[0, 1, 2]</a:t>
             </a:r>
           </a:p>
         </p:txBody>
@@ -12542,7 +12926,7 @@
       </p:grpSpPr>
       <p:sp>
         <p:nvSpPr>
-          <p:cNvPr id="375" name="Shape 375"/>
+          <p:cNvPr id="382" name="Shape 382"/>
           <p:cNvSpPr/>
           <p:nvPr>
             <p:ph type="title"/>
@@ -12570,63 +12954,66 @@
           <a:p>
             <a:pPr/>
             <a:r>
-              <a:t>Dictionary</a:t>
-            </a:r>
-          </a:p>
-        </p:txBody>
-      </p:sp>
-      <p:sp>
-        <p:nvSpPr>
-          <p:cNvPr id="376" name="Shape 376"/>
-          <p:cNvSpPr/>
-          <p:nvPr/>
-        </p:nvSpPr>
-        <p:spPr>
-          <a:xfrm>
-            <a:off x="697654" y="4775199"/>
-            <a:ext cx="11609491" cy="2057401"/>
-          </a:xfrm>
-          <a:prstGeom prst="rect">
-            <a:avLst/>
-          </a:prstGeom>
-          <a:ln w="12700">
-            <a:miter lim="400000"/>
-          </a:ln>
-          <a:extLst>
-            <a:ext uri="{C572A759-6A51-4108-AA02-DFA0A04FC94B}">
-              <ma14:wrappingTextBoxFlag xmlns:ma14="http://schemas.microsoft.com/office/mac/drawingml/2011/main" val="1"/>
-            </a:ext>
-          </a:extLst>
-        </p:spPr>
-        <p:txBody>
-          <a:bodyPr lIns="50800" tIns="50800" rIns="50800" bIns="50800" anchor="ctr">
-            <a:spAutoFit/>
-          </a:bodyPr>
+              <a:t>For-Loops</a:t>
+            </a:r>
+          </a:p>
+        </p:txBody>
+      </p:sp>
+      <p:sp>
+        <p:nvSpPr>
+          <p:cNvPr id="383" name="Shape 383"/>
+          <p:cNvSpPr/>
+          <p:nvPr>
+            <p:ph type="body" sz="half" idx="1"/>
+          </p:nvPr>
+        </p:nvSpPr>
+        <p:spPr>
+          <a:xfrm>
+            <a:off x="406400" y="3953767"/>
+            <a:ext cx="12192000" cy="2531601"/>
+          </a:xfrm>
+          <a:prstGeom prst="rect">
+            <a:avLst/>
+          </a:prstGeom>
+        </p:spPr>
+        <p:txBody>
+          <a:bodyPr/>
           <a:lstStyle/>
           <a:p>
-            <a:pPr>
-              <a:defRPr sz="5400">
-                <a:latin typeface="Anonymous Pro for Powerline"/>
-                <a:ea typeface="Anonymous Pro for Powerline"/>
-                <a:cs typeface="Anonymous Pro for Powerline"/>
-                <a:sym typeface="Anonymous Pro for Powerline"/>
-              </a:defRPr>
+            <a:pPr marL="649492" indent="-649492" defTabSz="537463">
+              <a:spcBef>
+                <a:spcPts val="2500"/>
+              </a:spcBef>
+              <a:buClrTx/>
+              <a:buSzPct val="40000"/>
+              <a:buFontTx/>
+              <a:buBlip>
+                <a:blip r:embed="rId2"/>
+              </a:buBlip>
+              <a:defRPr sz="5888"/>
             </a:pPr>
             <a:r>
-              <a:t>my_dict[“key1] = “new_value”</a:t>
-            </a:r>
-          </a:p>
-          <a:p>
-            <a:pPr>
-              <a:defRPr sz="5400">
-                <a:latin typeface="Anonymous Pro for Powerline"/>
-                <a:ea typeface="Anonymous Pro for Powerline"/>
-                <a:cs typeface="Anonymous Pro for Powerline"/>
-                <a:sym typeface="Anonymous Pro for Powerline"/>
-              </a:defRPr>
+              <a:t>Repeats a chunk of code</a:t>
+            </a:r>
+          </a:p>
+          <a:p>
+            <a:pPr marL="649492" indent="-649492" defTabSz="537463">
+              <a:lnSpc>
+                <a:spcPct val="200000"/>
+              </a:lnSpc>
+              <a:spcBef>
+                <a:spcPts val="2500"/>
+              </a:spcBef>
+              <a:buClrTx/>
+              <a:buSzPct val="40000"/>
+              <a:buFontTx/>
+              <a:buBlip>
+                <a:blip r:embed="rId2"/>
+              </a:buBlip>
+              <a:defRPr sz="5888"/>
             </a:pPr>
             <a:r>
-              <a:t> </a:t>
+              <a:t>Hands in different item each time</a:t>
             </a:r>
           </a:p>
         </p:txBody>
@@ -12659,7 +13046,7 @@
       </p:grpSpPr>
       <p:sp>
         <p:nvSpPr>
-          <p:cNvPr id="378" name="Shape 378"/>
+          <p:cNvPr id="385" name="Shape 385"/>
           <p:cNvSpPr/>
           <p:nvPr>
             <p:ph type="title"/>
@@ -12667,8 +13054,8 @@
         </p:nvSpPr>
         <p:spPr>
           <a:xfrm>
-            <a:off x="406400" y="1536700"/>
-            <a:ext cx="12192000" cy="1169260"/>
+            <a:off x="2802102" y="4038600"/>
+            <a:ext cx="7400596" cy="4521200"/>
           </a:xfrm>
           <a:prstGeom prst="rect">
             <a:avLst/>
@@ -12676,87 +13063,11 @@
         </p:spPr>
         <p:txBody>
           <a:bodyPr/>
-          <a:lstStyle>
-            <a:lvl1pPr defTabSz="403097">
-              <a:spcBef>
-                <a:spcPts val="1900"/>
-              </a:spcBef>
-              <a:defRPr sz="8280"/>
-            </a:lvl1pPr>
-          </a:lstStyle>
+          <a:lstStyle/>
           <a:p>
             <a:pPr/>
             <a:r>
-              <a:t>Dictionary</a:t>
-            </a:r>
-          </a:p>
-        </p:txBody>
-      </p:sp>
-      <p:sp>
-        <p:nvSpPr>
-          <p:cNvPr id="379" name="Shape 379"/>
-          <p:cNvSpPr/>
-          <p:nvPr/>
-        </p:nvSpPr>
-        <p:spPr>
-          <a:xfrm>
-            <a:off x="455296" y="4286249"/>
-            <a:ext cx="11851849" cy="3035301"/>
-          </a:xfrm>
-          <a:prstGeom prst="rect">
-            <a:avLst/>
-          </a:prstGeom>
-          <a:ln w="12700">
-            <a:miter lim="400000"/>
-          </a:ln>
-          <a:extLst>
-            <a:ext uri="{C572A759-6A51-4108-AA02-DFA0A04FC94B}">
-              <ma14:wrappingTextBoxFlag xmlns:ma14="http://schemas.microsoft.com/office/mac/drawingml/2011/main" val="1"/>
-            </a:ext>
-          </a:extLst>
-        </p:spPr>
-        <p:txBody>
-          <a:bodyPr lIns="50800" tIns="50800" rIns="50800" bIns="50800" anchor="ctr">
-            <a:spAutoFit/>
-          </a:bodyPr>
-          <a:lstStyle/>
-          <a:p>
-            <a:pPr>
-              <a:defRPr sz="5100">
-                <a:latin typeface="Anonymous Pro for Powerline"/>
-                <a:ea typeface="Anonymous Pro for Powerline"/>
-                <a:cs typeface="Anonymous Pro for Powerline"/>
-                <a:sym typeface="Anonymous Pro for Powerline"/>
-              </a:defRPr>
-            </a:pPr>
-            <a:r>
-              <a:t>for key in my_dict:</a:t>
-            </a:r>
-          </a:p>
-          <a:p>
-            <a:pPr>
-              <a:defRPr sz="5100">
-                <a:latin typeface="Anonymous Pro for Powerline"/>
-                <a:ea typeface="Anonymous Pro for Powerline"/>
-                <a:cs typeface="Anonymous Pro for Powerline"/>
-                <a:sym typeface="Anonymous Pro for Powerline"/>
-              </a:defRPr>
-            </a:pPr>
-            <a:r>
-              <a:t>    print(f“look at this {key}!”)</a:t>
-            </a:r>
-          </a:p>
-          <a:p>
-            <a:pPr>
-              <a:defRPr sz="5100">
-                <a:latin typeface="Anonymous Pro for Powerline"/>
-                <a:ea typeface="Anonymous Pro for Powerline"/>
-                <a:cs typeface="Anonymous Pro for Powerline"/>
-                <a:sym typeface="Anonymous Pro for Powerline"/>
-              </a:defRPr>
-            </a:pPr>
-            <a:r>
-              <a:t> </a:t>
+              <a:t>Exercises</a:t>
             </a:r>
           </a:p>
         </p:txBody>
@@ -12874,355 +13185,6 @@
             </a:pPr>
             <a:r>
               <a:t>“this str” == “that str”  </a:t>
-            </a:r>
-          </a:p>
-        </p:txBody>
-      </p:sp>
-    </p:spTree>
-  </p:cSld>
-  <p:clrMapOvr>
-    <a:masterClrMapping/>
-  </p:clrMapOvr>
-  <p:transition xmlns:p14="http://schemas.microsoft.com/office/powerpoint/2010/main" spd="med" advClick="1"/>
-</p:sld>
-</file>
-
-<file path=ppt/slides/slide50.xml><?xml version="1.0" encoding="utf-8"?>
-<p:sld xmlns:a="http://schemas.openxmlformats.org/drawingml/2006/main" xmlns:r="http://schemas.openxmlformats.org/officeDocument/2006/relationships" xmlns:p="http://schemas.openxmlformats.org/presentationml/2006/main" showMasterSp="1" showMasterPhAnim="1">
-  <p:cSld>
-    <p:spTree>
-      <p:nvGrpSpPr>
-        <p:cNvPr id="1" name=""/>
-        <p:cNvGrpSpPr/>
-        <p:nvPr/>
-      </p:nvGrpSpPr>
-      <p:grpSpPr>
-        <a:xfrm>
-          <a:off x="0" y="0"/>
-          <a:ext cx="0" cy="0"/>
-          <a:chOff x="0" y="0"/>
-          <a:chExt cx="0" cy="0"/>
-        </a:xfrm>
-      </p:grpSpPr>
-      <p:sp>
-        <p:nvSpPr>
-          <p:cNvPr id="381" name="Shape 381"/>
-          <p:cNvSpPr/>
-          <p:nvPr>
-            <p:ph type="title"/>
-          </p:nvPr>
-        </p:nvSpPr>
-        <p:spPr>
-          <a:xfrm>
-            <a:off x="406400" y="1536700"/>
-            <a:ext cx="12192000" cy="1169260"/>
-          </a:xfrm>
-          <a:prstGeom prst="rect">
-            <a:avLst/>
-          </a:prstGeom>
-        </p:spPr>
-        <p:txBody>
-          <a:bodyPr/>
-          <a:lstStyle>
-            <a:lvl1pPr defTabSz="403097">
-              <a:spcBef>
-                <a:spcPts val="1900"/>
-              </a:spcBef>
-              <a:defRPr sz="8280"/>
-            </a:lvl1pPr>
-          </a:lstStyle>
-          <a:p>
-            <a:pPr/>
-            <a:r>
-              <a:t>Dictionary</a:t>
-            </a:r>
-          </a:p>
-        </p:txBody>
-      </p:sp>
-      <p:sp>
-        <p:nvSpPr>
-          <p:cNvPr id="382" name="Shape 382"/>
-          <p:cNvSpPr/>
-          <p:nvPr/>
-        </p:nvSpPr>
-        <p:spPr>
-          <a:xfrm>
-            <a:off x="455296" y="4286249"/>
-            <a:ext cx="12192002" cy="3035301"/>
-          </a:xfrm>
-          <a:prstGeom prst="rect">
-            <a:avLst/>
-          </a:prstGeom>
-          <a:ln w="12700">
-            <a:miter lim="400000"/>
-          </a:ln>
-          <a:extLst>
-            <a:ext uri="{C572A759-6A51-4108-AA02-DFA0A04FC94B}">
-              <ma14:wrappingTextBoxFlag xmlns:ma14="http://schemas.microsoft.com/office/mac/drawingml/2011/main" val="1"/>
-            </a:ext>
-          </a:extLst>
-        </p:spPr>
-        <p:txBody>
-          <a:bodyPr lIns="50800" tIns="50800" rIns="50800" bIns="50800" anchor="ctr">
-            <a:spAutoFit/>
-          </a:bodyPr>
-          <a:lstStyle/>
-          <a:p>
-            <a:pPr>
-              <a:defRPr sz="5100">
-                <a:latin typeface="Anonymous Pro for Powerline"/>
-                <a:ea typeface="Anonymous Pro for Powerline"/>
-                <a:cs typeface="Anonymous Pro for Powerline"/>
-                <a:sym typeface="Anonymous Pro for Powerline"/>
-              </a:defRPr>
-            </a:pPr>
-            <a:r>
-              <a:t>for value in </a:t>
-            </a:r>
-            <a:r>
-              <a:rPr>
-                <a:solidFill>
-                  <a:schemeClr val="accent3"/>
-                </a:solidFill>
-              </a:rPr>
-              <a:t>my_dict.values()</a:t>
-            </a:r>
-            <a:r>
-              <a:t>:</a:t>
-            </a:r>
-          </a:p>
-          <a:p>
-            <a:pPr>
-              <a:defRPr sz="5100">
-                <a:latin typeface="Anonymous Pro for Powerline"/>
-                <a:ea typeface="Anonymous Pro for Powerline"/>
-                <a:cs typeface="Anonymous Pro for Powerline"/>
-                <a:sym typeface="Anonymous Pro for Powerline"/>
-              </a:defRPr>
-            </a:pPr>
-            <a:r>
-              <a:t>    print(f“look at this {value}”)</a:t>
-            </a:r>
-          </a:p>
-          <a:p>
-            <a:pPr>
-              <a:defRPr sz="5100">
-                <a:latin typeface="Anonymous Pro for Powerline"/>
-                <a:ea typeface="Anonymous Pro for Powerline"/>
-                <a:cs typeface="Anonymous Pro for Powerline"/>
-                <a:sym typeface="Anonymous Pro for Powerline"/>
-              </a:defRPr>
-            </a:pPr>
-            <a:r>
-              <a:t> </a:t>
-            </a:r>
-          </a:p>
-        </p:txBody>
-      </p:sp>
-    </p:spTree>
-  </p:cSld>
-  <p:clrMapOvr>
-    <a:masterClrMapping/>
-  </p:clrMapOvr>
-  <p:transition xmlns:p14="http://schemas.microsoft.com/office/powerpoint/2010/main" spd="med" advClick="1"/>
-</p:sld>
-</file>
-
-<file path=ppt/slides/slide51.xml><?xml version="1.0" encoding="utf-8"?>
-<p:sld xmlns:a="http://schemas.openxmlformats.org/drawingml/2006/main" xmlns:r="http://schemas.openxmlformats.org/officeDocument/2006/relationships" xmlns:p="http://schemas.openxmlformats.org/presentationml/2006/main" showMasterSp="1" showMasterPhAnim="1">
-  <p:cSld>
-    <p:spTree>
-      <p:nvGrpSpPr>
-        <p:cNvPr id="1" name=""/>
-        <p:cNvGrpSpPr/>
-        <p:nvPr/>
-      </p:nvGrpSpPr>
-      <p:grpSpPr>
-        <a:xfrm>
-          <a:off x="0" y="0"/>
-          <a:ext cx="0" cy="0"/>
-          <a:chOff x="0" y="0"/>
-          <a:chExt cx="0" cy="0"/>
-        </a:xfrm>
-      </p:grpSpPr>
-      <p:sp>
-        <p:nvSpPr>
-          <p:cNvPr id="384" name="Shape 384"/>
-          <p:cNvSpPr/>
-          <p:nvPr>
-            <p:ph type="title"/>
-          </p:nvPr>
-        </p:nvSpPr>
-        <p:spPr>
-          <a:xfrm>
-            <a:off x="406400" y="1536700"/>
-            <a:ext cx="12192000" cy="1169260"/>
-          </a:xfrm>
-          <a:prstGeom prst="rect">
-            <a:avLst/>
-          </a:prstGeom>
-        </p:spPr>
-        <p:txBody>
-          <a:bodyPr/>
-          <a:lstStyle>
-            <a:lvl1pPr defTabSz="403097">
-              <a:spcBef>
-                <a:spcPts val="1900"/>
-              </a:spcBef>
-              <a:defRPr sz="8280"/>
-            </a:lvl1pPr>
-          </a:lstStyle>
-          <a:p>
-            <a:pPr/>
-            <a:r>
-              <a:t>Dictionary</a:t>
-            </a:r>
-          </a:p>
-        </p:txBody>
-      </p:sp>
-      <p:sp>
-        <p:nvSpPr>
-          <p:cNvPr id="385" name="Shape 385"/>
-          <p:cNvSpPr/>
-          <p:nvPr/>
-        </p:nvSpPr>
-        <p:spPr>
-          <a:xfrm>
-            <a:off x="455296" y="3746499"/>
-            <a:ext cx="12192002" cy="4114801"/>
-          </a:xfrm>
-          <a:prstGeom prst="rect">
-            <a:avLst/>
-          </a:prstGeom>
-          <a:ln w="12700">
-            <a:miter lim="400000"/>
-          </a:ln>
-          <a:extLst>
-            <a:ext uri="{C572A759-6A51-4108-AA02-DFA0A04FC94B}">
-              <ma14:wrappingTextBoxFlag xmlns:ma14="http://schemas.microsoft.com/office/mac/drawingml/2011/main" val="1"/>
-            </a:ext>
-          </a:extLst>
-        </p:spPr>
-        <p:txBody>
-          <a:bodyPr lIns="50800" tIns="50800" rIns="50800" bIns="50800" anchor="ctr">
-            <a:spAutoFit/>
-          </a:bodyPr>
-          <a:lstStyle/>
-          <a:p>
-            <a:pPr>
-              <a:defRPr sz="5100">
-                <a:latin typeface="Anonymous Pro for Powerline"/>
-                <a:ea typeface="Anonymous Pro for Powerline"/>
-                <a:cs typeface="Anonymous Pro for Powerline"/>
-                <a:sym typeface="Anonymous Pro for Powerline"/>
-              </a:defRPr>
-            </a:pPr>
-            <a:r>
-              <a:t>for key, value in </a:t>
-            </a:r>
-            <a:r>
-              <a:rPr>
-                <a:solidFill>
-                  <a:schemeClr val="accent3"/>
-                </a:solidFill>
-              </a:rPr>
-              <a:t>my_dict.items()</a:t>
-            </a:r>
-            <a:r>
-              <a:t>:</a:t>
-            </a:r>
-          </a:p>
-          <a:p>
-            <a:pPr>
-              <a:defRPr sz="5100">
-                <a:latin typeface="Anonymous Pro for Powerline"/>
-                <a:ea typeface="Anonymous Pro for Powerline"/>
-                <a:cs typeface="Anonymous Pro for Powerline"/>
-                <a:sym typeface="Anonymous Pro for Powerline"/>
-              </a:defRPr>
-            </a:pPr>
-            <a:r>
-              <a:t>    print(f“look at this {key}!”)</a:t>
-            </a:r>
-          </a:p>
-          <a:p>
-            <a:pPr>
-              <a:defRPr sz="5100">
-                <a:latin typeface="Anonymous Pro for Powerline"/>
-                <a:ea typeface="Anonymous Pro for Powerline"/>
-                <a:cs typeface="Anonymous Pro for Powerline"/>
-                <a:sym typeface="Anonymous Pro for Powerline"/>
-              </a:defRPr>
-            </a:pPr>
-            <a:r>
-              <a:t>    print(f“look at this {value}”)</a:t>
-            </a:r>
-          </a:p>
-          <a:p>
-            <a:pPr>
-              <a:defRPr sz="5100">
-                <a:latin typeface="Anonymous Pro for Powerline"/>
-                <a:ea typeface="Anonymous Pro for Powerline"/>
-                <a:cs typeface="Anonymous Pro for Powerline"/>
-                <a:sym typeface="Anonymous Pro for Powerline"/>
-              </a:defRPr>
-            </a:pPr>
-            <a:r>
-              <a:t> </a:t>
-            </a:r>
-          </a:p>
-        </p:txBody>
-      </p:sp>
-    </p:spTree>
-  </p:cSld>
-  <p:clrMapOvr>
-    <a:masterClrMapping/>
-  </p:clrMapOvr>
-  <p:transition xmlns:p14="http://schemas.microsoft.com/office/powerpoint/2010/main" spd="med" advClick="1"/>
-</p:sld>
-</file>
-
-<file path=ppt/slides/slide52.xml><?xml version="1.0" encoding="utf-8"?>
-<p:sld xmlns:a="http://schemas.openxmlformats.org/drawingml/2006/main" xmlns:r="http://schemas.openxmlformats.org/officeDocument/2006/relationships" xmlns:p="http://schemas.openxmlformats.org/presentationml/2006/main" showMasterSp="1" showMasterPhAnim="1">
-  <p:cSld>
-    <p:spTree>
-      <p:nvGrpSpPr>
-        <p:cNvPr id="1" name=""/>
-        <p:cNvGrpSpPr/>
-        <p:nvPr/>
-      </p:nvGrpSpPr>
-      <p:grpSpPr>
-        <a:xfrm>
-          <a:off x="0" y="0"/>
-          <a:ext cx="0" cy="0"/>
-          <a:chOff x="0" y="0"/>
-          <a:chExt cx="0" cy="0"/>
-        </a:xfrm>
-      </p:grpSpPr>
-      <p:sp>
-        <p:nvSpPr>
-          <p:cNvPr id="387" name="Shape 387"/>
-          <p:cNvSpPr/>
-          <p:nvPr>
-            <p:ph type="title"/>
-          </p:nvPr>
-        </p:nvSpPr>
-        <p:spPr>
-          <a:xfrm>
-            <a:off x="2802102" y="4038600"/>
-            <a:ext cx="7400596" cy="4521200"/>
-          </a:xfrm>
-          <a:prstGeom prst="rect">
-            <a:avLst/>
-          </a:prstGeom>
-        </p:spPr>
-        <p:txBody>
-          <a:bodyPr/>
-          <a:lstStyle/>
-          <a:p>
-            <a:pPr/>
-            <a:r>
-              <a:t>Exercises</a:t>
             </a:r>
           </a:p>
         </p:txBody>

</xml_diff>